<commit_message>
Master Slide now slides
</commit_message>
<xml_diff>
--- a/Fangies.pptx
+++ b/Fangies.pptx
@@ -2,7 +2,7 @@
 <file path=ppt/presentation.xml><?xml version="1.0" encoding="utf-8"?>
 <p:presentation xmlns:a="http://schemas.openxmlformats.org/drawingml/2006/main" xmlns:r="http://schemas.openxmlformats.org/officeDocument/2006/relationships" xmlns:p="http://schemas.openxmlformats.org/presentationml/2006/main" saveSubsetFonts="1">
   <p:sldMasterIdLst>
-    <p:sldMasterId id="2147483733" r:id="rId1"/>
+    <p:sldMasterId id="2147483746" r:id="rId1"/>
   </p:sldMasterIdLst>
   <p:notesMasterIdLst>
     <p:notesMasterId r:id="rId35"/>
@@ -146,6 +146,9 @@
     <p:ext uri="{EFAFB233-063F-42B5-8137-9DF3F51BA10A}">
       <p15:sldGuideLst xmlns:p15="http://schemas.microsoft.com/office/powerpoint/2012/main"/>
     </p:ext>
+    <p:ext uri="{2D200454-40CA-4A62-9FC3-DE9A4176ACB9}">
+      <p15:notesGuideLst xmlns:p15="http://schemas.microsoft.com/office/powerpoint/2012/main"/>
+    </p:ext>
   </p:extLst>
 </p:presentation>
 </file>
@@ -2674,8 +2677,8 @@
           <a:lstStyle/>
           <a:p>
             <a:r>
-              <a:rPr lang="de-CH" dirty="0" err="1" smtClean="0"/>
-              <a:t>sdsdsdsd</a:t>
+              <a:rPr lang="de-CH" smtClean="0"/>
+              <a:t>S.Bakocs, L.Stahel</a:t>
             </a:r>
             <a:endParaRPr lang="de-CH" dirty="0"/>
           </a:p>
@@ -2707,7 +2710,7 @@
     </p:spTree>
     <p:extLst>
       <p:ext uri="{BB962C8B-B14F-4D97-AF65-F5344CB8AC3E}">
-        <p14:creationId xmlns:p14="http://schemas.microsoft.com/office/powerpoint/2010/main" val="2592906571"/>
+        <p14:creationId xmlns:p14="http://schemas.microsoft.com/office/powerpoint/2010/main" val="320420206"/>
       </p:ext>
     </p:extLst>
   </p:cSld>
@@ -2847,6 +2850,10 @@
           <a:bodyPr/>
           <a:lstStyle/>
           <a:p>
+            <a:r>
+              <a:rPr lang="de-CH" smtClean="0"/>
+              <a:t>S.Bakocs, L.Stahel</a:t>
+            </a:r>
             <a:endParaRPr lang="de-CH"/>
           </a:p>
         </p:txBody>
@@ -2877,7 +2884,7 @@
     </p:spTree>
     <p:extLst>
       <p:ext uri="{BB962C8B-B14F-4D97-AF65-F5344CB8AC3E}">
-        <p14:creationId xmlns:p14="http://schemas.microsoft.com/office/powerpoint/2010/main" val="1254042460"/>
+        <p14:creationId xmlns:p14="http://schemas.microsoft.com/office/powerpoint/2010/main" val="626396755"/>
       </p:ext>
     </p:extLst>
   </p:cSld>
@@ -3027,6 +3034,10 @@
           <a:bodyPr/>
           <a:lstStyle/>
           <a:p>
+            <a:r>
+              <a:rPr lang="de-CH" smtClean="0"/>
+              <a:t>S.Bakocs, L.Stahel</a:t>
+            </a:r>
             <a:endParaRPr lang="de-CH"/>
           </a:p>
         </p:txBody>
@@ -3057,7 +3068,7 @@
     </p:spTree>
     <p:extLst>
       <p:ext uri="{BB962C8B-B14F-4D97-AF65-F5344CB8AC3E}">
-        <p14:creationId xmlns:p14="http://schemas.microsoft.com/office/powerpoint/2010/main" val="3019438669"/>
+        <p14:creationId xmlns:p14="http://schemas.microsoft.com/office/powerpoint/2010/main" val="3907782045"/>
       </p:ext>
     </p:extLst>
   </p:cSld>
@@ -3329,7 +3340,7 @@
     </p:spTree>
     <p:extLst>
       <p:ext uri="{BB962C8B-B14F-4D97-AF65-F5344CB8AC3E}">
-        <p14:creationId xmlns:p14="http://schemas.microsoft.com/office/powerpoint/2010/main" val="1408322606"/>
+        <p14:creationId xmlns:p14="http://schemas.microsoft.com/office/powerpoint/2010/main" val="87348133"/>
       </p:ext>
     </p:extLst>
   </p:cSld>
@@ -3433,7 +3444,7 @@
       </p:sp>
       <p:sp>
         <p:nvSpPr>
-          <p:cNvPr id="7" name="Date Placeholder 6"/>
+          <p:cNvPr id="4" name="Date Placeholder 3"/>
           <p:cNvSpPr>
             <a:spLocks noGrp="1"/>
           </p:cNvSpPr>
@@ -3456,7 +3467,7 @@
       </p:sp>
       <p:sp>
         <p:nvSpPr>
-          <p:cNvPr id="8" name="Footer Placeholder 7"/>
+          <p:cNvPr id="5" name="Footer Placeholder 4"/>
           <p:cNvSpPr>
             <a:spLocks noGrp="1"/>
           </p:cNvSpPr>
@@ -3469,13 +3480,17 @@
           <a:bodyPr/>
           <a:lstStyle/>
           <a:p>
+            <a:r>
+              <a:rPr lang="de-CH" smtClean="0"/>
+              <a:t>S.Bakocs, L.Stahel</a:t>
+            </a:r>
             <a:endParaRPr lang="de-CH"/>
           </a:p>
         </p:txBody>
       </p:sp>
       <p:sp>
         <p:nvSpPr>
-          <p:cNvPr id="9" name="Slide Number Placeholder 8"/>
+          <p:cNvPr id="6" name="Slide Number Placeholder 5"/>
           <p:cNvSpPr>
             <a:spLocks noGrp="1"/>
           </p:cNvSpPr>
@@ -3499,20 +3514,13 @@
     </p:spTree>
     <p:extLst>
       <p:ext uri="{BB962C8B-B14F-4D97-AF65-F5344CB8AC3E}">
-        <p14:creationId xmlns:p14="http://schemas.microsoft.com/office/powerpoint/2010/main" val="746039812"/>
+        <p14:creationId xmlns:p14="http://schemas.microsoft.com/office/powerpoint/2010/main" val="3165900164"/>
       </p:ext>
     </p:extLst>
   </p:cSld>
   <p:clrMapOvr>
     <a:masterClrMapping/>
   </p:clrMapOvr>
-  <p:timing>
-    <p:tnLst>
-      <p:par>
-        <p:cTn id="1" dur="indefinite" restart="never" nodeType="tmRoot"/>
-      </p:par>
-    </p:tnLst>
-  </p:timing>
 </p:sldLayout>
 </file>
 
@@ -3722,6 +3730,10 @@
           <a:bodyPr/>
           <a:lstStyle/>
           <a:p>
+            <a:r>
+              <a:rPr lang="de-CH" smtClean="0"/>
+              <a:t>S.Bakocs, L.Stahel</a:t>
+            </a:r>
             <a:endParaRPr lang="de-CH"/>
           </a:p>
         </p:txBody>
@@ -3752,7 +3764,7 @@
     </p:spTree>
     <p:extLst>
       <p:ext uri="{BB962C8B-B14F-4D97-AF65-F5344CB8AC3E}">
-        <p14:creationId xmlns:p14="http://schemas.microsoft.com/office/powerpoint/2010/main" val="2683904265"/>
+        <p14:creationId xmlns:p14="http://schemas.microsoft.com/office/powerpoint/2010/main" val="1458886443"/>
       </p:ext>
     </p:extLst>
   </p:cSld>
@@ -3954,6 +3966,10 @@
           <a:bodyPr/>
           <a:lstStyle/>
           <a:p>
+            <a:r>
+              <a:rPr lang="de-CH" smtClean="0"/>
+              <a:t>S.Bakocs, L.Stahel</a:t>
+            </a:r>
             <a:endParaRPr lang="de-CH"/>
           </a:p>
         </p:txBody>
@@ -3984,7 +4000,7 @@
     </p:spTree>
     <p:extLst>
       <p:ext uri="{BB962C8B-B14F-4D97-AF65-F5344CB8AC3E}">
-        <p14:creationId xmlns:p14="http://schemas.microsoft.com/office/powerpoint/2010/main" val="3904384109"/>
+        <p14:creationId xmlns:p14="http://schemas.microsoft.com/office/powerpoint/2010/main" val="1369478740"/>
       </p:ext>
     </p:extLst>
   </p:cSld>
@@ -4321,6 +4337,10 @@
           <a:bodyPr/>
           <a:lstStyle/>
           <a:p>
+            <a:r>
+              <a:rPr lang="de-CH" smtClean="0"/>
+              <a:t>S.Bakocs, L.Stahel</a:t>
+            </a:r>
             <a:endParaRPr lang="de-CH"/>
           </a:p>
         </p:txBody>
@@ -4351,7 +4371,7 @@
     </p:spTree>
     <p:extLst>
       <p:ext uri="{BB962C8B-B14F-4D97-AF65-F5344CB8AC3E}">
-        <p14:creationId xmlns:p14="http://schemas.microsoft.com/office/powerpoint/2010/main" val="522935289"/>
+        <p14:creationId xmlns:p14="http://schemas.microsoft.com/office/powerpoint/2010/main" val="2315196328"/>
       </p:ext>
     </p:extLst>
   </p:cSld>
@@ -4439,6 +4459,10 @@
           <a:bodyPr/>
           <a:lstStyle/>
           <a:p>
+            <a:r>
+              <a:rPr lang="de-CH" smtClean="0"/>
+              <a:t>S.Bakocs, L.Stahel</a:t>
+            </a:r>
             <a:endParaRPr lang="de-CH"/>
           </a:p>
         </p:txBody>
@@ -4469,7 +4493,7 @@
     </p:spTree>
     <p:extLst>
       <p:ext uri="{BB962C8B-B14F-4D97-AF65-F5344CB8AC3E}">
-        <p14:creationId xmlns:p14="http://schemas.microsoft.com/office/powerpoint/2010/main" val="2992491791"/>
+        <p14:creationId xmlns:p14="http://schemas.microsoft.com/office/powerpoint/2010/main" val="648342069"/>
       </p:ext>
     </p:extLst>
   </p:cSld>
@@ -4534,6 +4558,10 @@
           <a:bodyPr/>
           <a:lstStyle/>
           <a:p>
+            <a:r>
+              <a:rPr lang="de-CH" smtClean="0"/>
+              <a:t>S.Bakocs, L.Stahel</a:t>
+            </a:r>
             <a:endParaRPr lang="de-CH"/>
           </a:p>
         </p:txBody>
@@ -4564,7 +4592,7 @@
     </p:spTree>
     <p:extLst>
       <p:ext uri="{BB962C8B-B14F-4D97-AF65-F5344CB8AC3E}">
-        <p14:creationId xmlns:p14="http://schemas.microsoft.com/office/powerpoint/2010/main" val="3384319290"/>
+        <p14:creationId xmlns:p14="http://schemas.microsoft.com/office/powerpoint/2010/main" val="3603459799"/>
       </p:ext>
     </p:extLst>
   </p:cSld>
@@ -4811,6 +4839,10 @@
           <a:bodyPr/>
           <a:lstStyle/>
           <a:p>
+            <a:r>
+              <a:rPr lang="de-CH" smtClean="0"/>
+              <a:t>S.Bakocs, L.Stahel</a:t>
+            </a:r>
             <a:endParaRPr lang="de-CH"/>
           </a:p>
         </p:txBody>
@@ -4841,7 +4873,7 @@
     </p:spTree>
     <p:extLst>
       <p:ext uri="{BB962C8B-B14F-4D97-AF65-F5344CB8AC3E}">
-        <p14:creationId xmlns:p14="http://schemas.microsoft.com/office/powerpoint/2010/main" val="1219030962"/>
+        <p14:creationId xmlns:p14="http://schemas.microsoft.com/office/powerpoint/2010/main" val="3350657858"/>
       </p:ext>
     </p:extLst>
   </p:cSld>
@@ -5064,6 +5096,10 @@
           <a:bodyPr/>
           <a:lstStyle/>
           <a:p>
+            <a:r>
+              <a:rPr lang="de-CH" smtClean="0"/>
+              <a:t>S.Bakocs, L.Stahel</a:t>
+            </a:r>
             <a:endParaRPr lang="de-CH"/>
           </a:p>
         </p:txBody>
@@ -5094,7 +5130,7 @@
     </p:spTree>
     <p:extLst>
       <p:ext uri="{BB962C8B-B14F-4D97-AF65-F5344CB8AC3E}">
-        <p14:creationId xmlns:p14="http://schemas.microsoft.com/office/powerpoint/2010/main" val="2991669654"/>
+        <p14:creationId xmlns:p14="http://schemas.microsoft.com/office/powerpoint/2010/main" val="1404360069"/>
       </p:ext>
     </p:extLst>
   </p:cSld>
@@ -5254,11 +5290,11 @@
             </a:lvl1pPr>
           </a:lstStyle>
           <a:p>
-            <a:fld id="{D47FFB9B-0AC0-4702-BD5D-BB6C896DA0F2}" type="datetimeFigureOut">
+            <a:fld id="{99295F8A-F3B9-498B-A05D-D006CEAB37E4}" type="datetimeFigureOut">
               <a:rPr lang="de-CH" smtClean="0"/>
               <a:t>04.01.2015</a:t>
             </a:fld>
-            <a:endParaRPr lang="de-CH" dirty="0"/>
+            <a:endParaRPr lang="de-CH"/>
           </a:p>
         </p:txBody>
       </p:sp>
@@ -5295,6 +5331,10 @@
             </a:lvl1pPr>
           </a:lstStyle>
           <a:p>
+            <a:r>
+              <a:rPr lang="de-CH" smtClean="0"/>
+              <a:t>S.Bakocs, L.Stahel</a:t>
+            </a:r>
             <a:endParaRPr lang="de-CH"/>
           </a:p>
         </p:txBody>
@@ -5332,7 +5372,7 @@
             </a:lvl1pPr>
           </a:lstStyle>
           <a:p>
-            <a:fld id="{0903F862-C958-4CC4-BEED-6508A7FB4281}" type="slidenum">
+            <a:fld id="{97B257D3-3168-41FB-94D0-3705FB893E26}" type="slidenum">
               <a:rPr lang="de-CH" smtClean="0"/>
               <a:t>‹#›</a:t>
             </a:fld>
@@ -5343,25 +5383,26 @@
     </p:spTree>
     <p:extLst>
       <p:ext uri="{BB962C8B-B14F-4D97-AF65-F5344CB8AC3E}">
-        <p14:creationId xmlns:p14="http://schemas.microsoft.com/office/powerpoint/2010/main" val="2064703852"/>
+        <p14:creationId xmlns:p14="http://schemas.microsoft.com/office/powerpoint/2010/main" val="3472317125"/>
       </p:ext>
     </p:extLst>
   </p:cSld>
   <p:clrMap bg1="lt1" tx1="dk1" bg2="lt2" tx2="dk2" accent1="accent1" accent2="accent2" accent3="accent3" accent4="accent4" accent5="accent5" accent6="accent6" hlink="hlink" folHlink="folHlink"/>
   <p:sldLayoutIdLst>
-    <p:sldLayoutId id="2147483734" r:id="rId1"/>
-    <p:sldLayoutId id="2147483735" r:id="rId2"/>
-    <p:sldLayoutId id="2147483736" r:id="rId3"/>
-    <p:sldLayoutId id="2147483737" r:id="rId4"/>
-    <p:sldLayoutId id="2147483738" r:id="rId5"/>
-    <p:sldLayoutId id="2147483739" r:id="rId6"/>
-    <p:sldLayoutId id="2147483740" r:id="rId7"/>
-    <p:sldLayoutId id="2147483741" r:id="rId8"/>
-    <p:sldLayoutId id="2147483742" r:id="rId9"/>
-    <p:sldLayoutId id="2147483743" r:id="rId10"/>
-    <p:sldLayoutId id="2147483744" r:id="rId11"/>
-    <p:sldLayoutId id="2147483745" r:id="rId12"/>
+    <p:sldLayoutId id="2147483747" r:id="rId1"/>
+    <p:sldLayoutId id="2147483748" r:id="rId2"/>
+    <p:sldLayoutId id="2147483749" r:id="rId3"/>
+    <p:sldLayoutId id="2147483750" r:id="rId4"/>
+    <p:sldLayoutId id="2147483751" r:id="rId5"/>
+    <p:sldLayoutId id="2147483752" r:id="rId6"/>
+    <p:sldLayoutId id="2147483753" r:id="rId7"/>
+    <p:sldLayoutId id="2147483754" r:id="rId8"/>
+    <p:sldLayoutId id="2147483755" r:id="rId9"/>
+    <p:sldLayoutId id="2147483756" r:id="rId10"/>
+    <p:sldLayoutId id="2147483757" r:id="rId11"/>
+    <p:sldLayoutId id="2147483758" r:id="rId12"/>
   </p:sldLayoutIdLst>
+  <p:hf hdr="0"/>
   <p:txStyles>
     <p:titleStyle>
       <a:lvl1pPr algn="l" defTabSz="914400" rtl="0" eaLnBrk="1" latinLnBrk="0" hangingPunct="1">
@@ -5678,7 +5719,7 @@
           <a:lstStyle/>
           <a:p>
             <a:r>
-              <a:rPr lang="de-CH" smtClean="0"/>
+              <a:rPr lang="de-CH" dirty="0" err="1" smtClean="0"/>
               <a:t>Fangies</a:t>
             </a:r>
             <a:endParaRPr lang="de-CH" dirty="0"/>
@@ -5703,49 +5744,138 @@
         </p:spPr>
         <p:txBody>
           <a:bodyPr>
-            <a:normAutofit lnSpcReduction="10000"/>
+            <a:normAutofit/>
           </a:bodyPr>
           <a:lstStyle/>
           <a:p>
             <a:r>
-              <a:rPr lang="de-CH" sz="2000" smtClean="0"/>
-              <a:t>RunRunRainbowRun </a:t>
-            </a:r>
-            <a:r>
-              <a:rPr lang="de-CH" sz="2000" smtClean="0">
+              <a:rPr lang="de-CH" sz="2000" dirty="0" err="1" smtClean="0"/>
+              <a:t>RunRunRainbowRun</a:t>
+            </a:r>
+            <a:r>
+              <a:rPr lang="de-CH" sz="2000" dirty="0" smtClean="0"/>
+              <a:t> </a:t>
+            </a:r>
+            <a:r>
+              <a:rPr lang="de-CH" sz="2000" dirty="0" smtClean="0">
                 <a:sym typeface="Wingdings" panose="05000000000000000000" pitchFamily="2" charset="2"/>
               </a:rPr>
-              <a:t> Versteckies  Fangies</a:t>
-            </a:r>
-            <a:endParaRPr lang="de-CH" sz="2000" smtClean="0"/>
-          </a:p>
-          <a:p>
-            <a:endParaRPr lang="de-CH" smtClean="0"/>
-          </a:p>
-          <a:p>
-            <a:endParaRPr lang="de-CH" smtClean="0"/>
-          </a:p>
-          <a:p>
-            <a:endParaRPr lang="de-CH" smtClean="0"/>
-          </a:p>
-          <a:p>
-            <a:endParaRPr lang="de-CH" sz="1800" smtClean="0"/>
-          </a:p>
-          <a:p>
-            <a:endParaRPr lang="de-CH" sz="1800" smtClean="0"/>
-          </a:p>
-          <a:p>
-            <a:r>
-              <a:rPr lang="de-CH" sz="1600" smtClean="0"/>
-              <a:t>Eine Projektarbeit für Programmieren (3)</a:t>
-            </a:r>
-          </a:p>
-          <a:p>
-            <a:r>
-              <a:rPr lang="de-CH" sz="1600" smtClean="0"/>
-              <a:t>S. Bakocs, L. Stahel</a:t>
-            </a:r>
-            <a:endParaRPr lang="de-CH" sz="1600" dirty="0"/>
+              <a:t> </a:t>
+            </a:r>
+            <a:r>
+              <a:rPr lang="de-CH" sz="2000" dirty="0" err="1" smtClean="0">
+                <a:sym typeface="Wingdings" panose="05000000000000000000" pitchFamily="2" charset="2"/>
+              </a:rPr>
+              <a:t>Versteckies</a:t>
+            </a:r>
+            <a:r>
+              <a:rPr lang="de-CH" sz="2000" dirty="0" smtClean="0">
+                <a:sym typeface="Wingdings" panose="05000000000000000000" pitchFamily="2" charset="2"/>
+              </a:rPr>
+              <a:t>  </a:t>
+            </a:r>
+            <a:r>
+              <a:rPr lang="de-CH" sz="2000" dirty="0" err="1" smtClean="0">
+                <a:sym typeface="Wingdings" panose="05000000000000000000" pitchFamily="2" charset="2"/>
+              </a:rPr>
+              <a:t>Fangies</a:t>
+            </a:r>
+            <a:endParaRPr lang="de-CH" sz="2000" dirty="0" smtClean="0"/>
+          </a:p>
+          <a:p>
+            <a:endParaRPr lang="de-CH" dirty="0" smtClean="0"/>
+          </a:p>
+          <a:p>
+            <a:endParaRPr lang="de-CH" dirty="0" smtClean="0"/>
+          </a:p>
+          <a:p>
+            <a:endParaRPr lang="de-CH" dirty="0" smtClean="0"/>
+          </a:p>
+          <a:p>
+            <a:endParaRPr lang="de-CH" sz="1800" dirty="0" smtClean="0"/>
+          </a:p>
+          <a:p>
+            <a:endParaRPr lang="de-CH" sz="1800" dirty="0" smtClean="0"/>
+          </a:p>
+          <a:p>
+            <a:r>
+              <a:rPr lang="de-CH" sz="1600" dirty="0" smtClean="0"/>
+              <a:t>Eine Projektarbeit für Programmieren (3</a:t>
+            </a:r>
+            <a:r>
+              <a:rPr lang="de-CH" sz="1600" dirty="0" smtClean="0"/>
+              <a:t>)</a:t>
+            </a:r>
+            <a:endParaRPr lang="de-CH" sz="1600" dirty="0" smtClean="0"/>
+          </a:p>
+        </p:txBody>
+      </p:sp>
+      <p:sp>
+        <p:nvSpPr>
+          <p:cNvPr id="4" name="Date Placeholder 3"/>
+          <p:cNvSpPr>
+            <a:spLocks noGrp="1"/>
+          </p:cNvSpPr>
+          <p:nvPr>
+            <p:ph type="dt" sz="half" idx="10"/>
+          </p:nvPr>
+        </p:nvSpPr>
+        <p:spPr/>
+        <p:txBody>
+          <a:bodyPr/>
+          <a:lstStyle/>
+          <a:p>
+            <a:fld id="{D29B7871-5151-4F99-8472-0EFF1D2BDCCA}" type="datetime1">
+              <a:rPr lang="de-CH" smtClean="0"/>
+              <a:t>04.01.2015</a:t>
+            </a:fld>
+            <a:endParaRPr lang="de-CH"/>
+          </a:p>
+        </p:txBody>
+      </p:sp>
+      <p:sp>
+        <p:nvSpPr>
+          <p:cNvPr id="6" name="Footer Placeholder 5"/>
+          <p:cNvSpPr>
+            <a:spLocks noGrp="1"/>
+          </p:cNvSpPr>
+          <p:nvPr>
+            <p:ph type="ftr" sz="quarter" idx="11"/>
+          </p:nvPr>
+        </p:nvSpPr>
+        <p:spPr/>
+        <p:txBody>
+          <a:bodyPr/>
+          <a:lstStyle/>
+          <a:p>
+            <a:r>
+              <a:rPr lang="de-CH" smtClean="0"/>
+              <a:t>S.Bakocs, L.Stahel</a:t>
+            </a:r>
+            <a:endParaRPr lang="de-CH" dirty="0"/>
+          </a:p>
+        </p:txBody>
+      </p:sp>
+      <p:sp>
+        <p:nvSpPr>
+          <p:cNvPr id="7" name="Slide Number Placeholder 6"/>
+          <p:cNvSpPr>
+            <a:spLocks noGrp="1"/>
+          </p:cNvSpPr>
+          <p:nvPr>
+            <p:ph type="sldNum" sz="quarter" idx="12"/>
+          </p:nvPr>
+        </p:nvSpPr>
+        <p:spPr/>
+        <p:txBody>
+          <a:bodyPr/>
+          <a:lstStyle/>
+          <a:p>
+            <a:fld id="{0903F862-C958-4CC4-BEED-6508A7FB4281}" type="slidenum">
+              <a:rPr lang="de-CH" smtClean="0"/>
+              <a:t>1</a:t>
+            </a:fld>
+            <a:endParaRPr lang="de-CH"/>
           </a:p>
         </p:txBody>
       </p:sp>
@@ -5881,6 +6011,75 @@
               <a:buNone/>
             </a:pPr>
             <a:endParaRPr/>
+          </a:p>
+        </p:txBody>
+      </p:sp>
+      <p:sp>
+        <p:nvSpPr>
+          <p:cNvPr id="2" name="Date Placeholder 1"/>
+          <p:cNvSpPr>
+            <a:spLocks noGrp="1"/>
+          </p:cNvSpPr>
+          <p:nvPr>
+            <p:ph type="dt" sz="half" idx="10"/>
+          </p:nvPr>
+        </p:nvSpPr>
+        <p:spPr/>
+        <p:txBody>
+          <a:bodyPr/>
+          <a:lstStyle/>
+          <a:p>
+            <a:fld id="{86D9E498-8D2F-4556-9312-B7C65F8ABACE}" type="datetime1">
+              <a:rPr lang="de-CH" smtClean="0"/>
+              <a:t>04.01.2015</a:t>
+            </a:fld>
+            <a:endParaRPr lang="de-CH" dirty="0"/>
+          </a:p>
+        </p:txBody>
+      </p:sp>
+      <p:sp>
+        <p:nvSpPr>
+          <p:cNvPr id="4" name="Footer Placeholder 3"/>
+          <p:cNvSpPr>
+            <a:spLocks noGrp="1"/>
+          </p:cNvSpPr>
+          <p:nvPr>
+            <p:ph type="ftr" sz="quarter" idx="11"/>
+          </p:nvPr>
+        </p:nvSpPr>
+        <p:spPr/>
+        <p:txBody>
+          <a:bodyPr/>
+          <a:lstStyle/>
+          <a:p>
+            <a:r>
+              <a:rPr lang="de-CH" smtClean="0"/>
+              <a:t>S.Bakocs, L.Stahel</a:t>
+            </a:r>
+            <a:endParaRPr lang="de-CH"/>
+          </a:p>
+        </p:txBody>
+      </p:sp>
+      <p:sp>
+        <p:nvSpPr>
+          <p:cNvPr id="5" name="Slide Number Placeholder 4"/>
+          <p:cNvSpPr>
+            <a:spLocks noGrp="1"/>
+          </p:cNvSpPr>
+          <p:nvPr>
+            <p:ph type="sldNum" sz="quarter" idx="12"/>
+          </p:nvPr>
+        </p:nvSpPr>
+        <p:spPr/>
+        <p:txBody>
+          <a:bodyPr/>
+          <a:lstStyle/>
+          <a:p>
+            <a:fld id="{0903F862-C958-4CC4-BEED-6508A7FB4281}" type="slidenum">
+              <a:rPr lang="de-CH" smtClean="0"/>
+              <a:t>10</a:t>
+            </a:fld>
+            <a:endParaRPr lang="de-CH"/>
           </a:p>
         </p:txBody>
       </p:sp>
@@ -6050,6 +6249,75 @@
           </a:p>
         </p:txBody>
       </p:sp>
+      <p:sp>
+        <p:nvSpPr>
+          <p:cNvPr id="2" name="Date Placeholder 1"/>
+          <p:cNvSpPr>
+            <a:spLocks noGrp="1"/>
+          </p:cNvSpPr>
+          <p:nvPr>
+            <p:ph type="dt" sz="half" idx="10"/>
+          </p:nvPr>
+        </p:nvSpPr>
+        <p:spPr/>
+        <p:txBody>
+          <a:bodyPr/>
+          <a:lstStyle/>
+          <a:p>
+            <a:fld id="{7A9CCD88-89EA-4FB5-AC11-8BD2B2308B6F}" type="datetime1">
+              <a:rPr lang="de-CH" smtClean="0"/>
+              <a:t>04.01.2015</a:t>
+            </a:fld>
+            <a:endParaRPr lang="de-CH" dirty="0"/>
+          </a:p>
+        </p:txBody>
+      </p:sp>
+      <p:sp>
+        <p:nvSpPr>
+          <p:cNvPr id="4" name="Footer Placeholder 3"/>
+          <p:cNvSpPr>
+            <a:spLocks noGrp="1"/>
+          </p:cNvSpPr>
+          <p:nvPr>
+            <p:ph type="ftr" sz="quarter" idx="11"/>
+          </p:nvPr>
+        </p:nvSpPr>
+        <p:spPr/>
+        <p:txBody>
+          <a:bodyPr/>
+          <a:lstStyle/>
+          <a:p>
+            <a:r>
+              <a:rPr lang="de-CH" smtClean="0"/>
+              <a:t>S.Bakocs, L.Stahel</a:t>
+            </a:r>
+            <a:endParaRPr lang="de-CH"/>
+          </a:p>
+        </p:txBody>
+      </p:sp>
+      <p:sp>
+        <p:nvSpPr>
+          <p:cNvPr id="5" name="Slide Number Placeholder 4"/>
+          <p:cNvSpPr>
+            <a:spLocks noGrp="1"/>
+          </p:cNvSpPr>
+          <p:nvPr>
+            <p:ph type="sldNum" sz="quarter" idx="12"/>
+          </p:nvPr>
+        </p:nvSpPr>
+        <p:spPr/>
+        <p:txBody>
+          <a:bodyPr/>
+          <a:lstStyle/>
+          <a:p>
+            <a:fld id="{0903F862-C958-4CC4-BEED-6508A7FB4281}" type="slidenum">
+              <a:rPr lang="de-CH" smtClean="0"/>
+              <a:t>11</a:t>
+            </a:fld>
+            <a:endParaRPr lang="de-CH"/>
+          </a:p>
+        </p:txBody>
+      </p:sp>
     </p:spTree>
     <p:extLst>
       <p:ext uri="{BB962C8B-B14F-4D97-AF65-F5344CB8AC3E}">
@@ -6216,6 +6484,75 @@
           </a:p>
         </p:txBody>
       </p:sp>
+      <p:sp>
+        <p:nvSpPr>
+          <p:cNvPr id="2" name="Date Placeholder 1"/>
+          <p:cNvSpPr>
+            <a:spLocks noGrp="1"/>
+          </p:cNvSpPr>
+          <p:nvPr>
+            <p:ph type="dt" sz="half" idx="10"/>
+          </p:nvPr>
+        </p:nvSpPr>
+        <p:spPr/>
+        <p:txBody>
+          <a:bodyPr/>
+          <a:lstStyle/>
+          <a:p>
+            <a:fld id="{BD525B64-1AFB-47EA-9951-E1A66F70B6A7}" type="datetime1">
+              <a:rPr lang="de-CH" smtClean="0"/>
+              <a:t>04.01.2015</a:t>
+            </a:fld>
+            <a:endParaRPr lang="de-CH" dirty="0"/>
+          </a:p>
+        </p:txBody>
+      </p:sp>
+      <p:sp>
+        <p:nvSpPr>
+          <p:cNvPr id="4" name="Footer Placeholder 3"/>
+          <p:cNvSpPr>
+            <a:spLocks noGrp="1"/>
+          </p:cNvSpPr>
+          <p:nvPr>
+            <p:ph type="ftr" sz="quarter" idx="11"/>
+          </p:nvPr>
+        </p:nvSpPr>
+        <p:spPr/>
+        <p:txBody>
+          <a:bodyPr/>
+          <a:lstStyle/>
+          <a:p>
+            <a:r>
+              <a:rPr lang="de-CH" smtClean="0"/>
+              <a:t>S.Bakocs, L.Stahel</a:t>
+            </a:r>
+            <a:endParaRPr lang="de-CH"/>
+          </a:p>
+        </p:txBody>
+      </p:sp>
+      <p:sp>
+        <p:nvSpPr>
+          <p:cNvPr id="5" name="Slide Number Placeholder 4"/>
+          <p:cNvSpPr>
+            <a:spLocks noGrp="1"/>
+          </p:cNvSpPr>
+          <p:nvPr>
+            <p:ph type="sldNum" sz="quarter" idx="12"/>
+          </p:nvPr>
+        </p:nvSpPr>
+        <p:spPr/>
+        <p:txBody>
+          <a:bodyPr/>
+          <a:lstStyle/>
+          <a:p>
+            <a:fld id="{0903F862-C958-4CC4-BEED-6508A7FB4281}" type="slidenum">
+              <a:rPr lang="de-CH" smtClean="0"/>
+              <a:t>12</a:t>
+            </a:fld>
+            <a:endParaRPr lang="de-CH"/>
+          </a:p>
+        </p:txBody>
+      </p:sp>
     </p:spTree>
     <p:extLst>
       <p:ext uri="{BB962C8B-B14F-4D97-AF65-F5344CB8AC3E}">
@@ -7218,6 +7555,75 @@
       </p:sp>
       <p:sp>
         <p:nvSpPr>
+          <p:cNvPr id="2" name="Date Placeholder 1"/>
+          <p:cNvSpPr>
+            <a:spLocks noGrp="1"/>
+          </p:cNvSpPr>
+          <p:nvPr>
+            <p:ph type="dt" sz="half" idx="10"/>
+          </p:nvPr>
+        </p:nvSpPr>
+        <p:spPr/>
+        <p:txBody>
+          <a:bodyPr/>
+          <a:lstStyle/>
+          <a:p>
+            <a:fld id="{B427DDBE-593A-432D-8BB7-172F9454FD78}" type="datetime1">
+              <a:rPr lang="de-CH" smtClean="0"/>
+              <a:t>04.01.2015</a:t>
+            </a:fld>
+            <a:endParaRPr lang="de-CH" dirty="0"/>
+          </a:p>
+        </p:txBody>
+      </p:sp>
+      <p:sp>
+        <p:nvSpPr>
+          <p:cNvPr id="4" name="Footer Placeholder 3"/>
+          <p:cNvSpPr>
+            <a:spLocks noGrp="1"/>
+          </p:cNvSpPr>
+          <p:nvPr>
+            <p:ph type="ftr" sz="quarter" idx="11"/>
+          </p:nvPr>
+        </p:nvSpPr>
+        <p:spPr/>
+        <p:txBody>
+          <a:bodyPr/>
+          <a:lstStyle/>
+          <a:p>
+            <a:r>
+              <a:rPr lang="de-CH" smtClean="0"/>
+              <a:t>S.Bakocs, L.Stahel</a:t>
+            </a:r>
+            <a:endParaRPr lang="de-CH"/>
+          </a:p>
+        </p:txBody>
+      </p:sp>
+      <p:sp>
+        <p:nvSpPr>
+          <p:cNvPr id="5" name="Slide Number Placeholder 4"/>
+          <p:cNvSpPr>
+            <a:spLocks noGrp="1"/>
+          </p:cNvSpPr>
+          <p:nvPr>
+            <p:ph type="sldNum" sz="quarter" idx="12"/>
+          </p:nvPr>
+        </p:nvSpPr>
+        <p:spPr/>
+        <p:txBody>
+          <a:bodyPr/>
+          <a:lstStyle/>
+          <a:p>
+            <a:fld id="{0903F862-C958-4CC4-BEED-6508A7FB4281}" type="slidenum">
+              <a:rPr lang="de-CH" smtClean="0"/>
+              <a:t>13</a:t>
+            </a:fld>
+            <a:endParaRPr lang="de-CH"/>
+          </a:p>
+        </p:txBody>
+      </p:sp>
+      <p:sp>
+        <p:nvSpPr>
           <p:cNvPr id="86" name="Shape 86"/>
           <p:cNvSpPr/>
           <p:nvPr/>
@@ -7427,6 +7833,75 @@
           </a:p>
         </p:txBody>
       </p:sp>
+      <p:sp>
+        <p:nvSpPr>
+          <p:cNvPr id="2" name="Date Placeholder 1"/>
+          <p:cNvSpPr>
+            <a:spLocks noGrp="1"/>
+          </p:cNvSpPr>
+          <p:nvPr>
+            <p:ph type="dt" sz="half" idx="10"/>
+          </p:nvPr>
+        </p:nvSpPr>
+        <p:spPr/>
+        <p:txBody>
+          <a:bodyPr/>
+          <a:lstStyle/>
+          <a:p>
+            <a:fld id="{D4DBAF50-C940-45E3-A03F-53991D10DADC}" type="datetime1">
+              <a:rPr lang="de-CH" smtClean="0"/>
+              <a:t>04.01.2015</a:t>
+            </a:fld>
+            <a:endParaRPr lang="de-CH" dirty="0"/>
+          </a:p>
+        </p:txBody>
+      </p:sp>
+      <p:sp>
+        <p:nvSpPr>
+          <p:cNvPr id="4" name="Footer Placeholder 3"/>
+          <p:cNvSpPr>
+            <a:spLocks noGrp="1"/>
+          </p:cNvSpPr>
+          <p:nvPr>
+            <p:ph type="ftr" sz="quarter" idx="11"/>
+          </p:nvPr>
+        </p:nvSpPr>
+        <p:spPr/>
+        <p:txBody>
+          <a:bodyPr/>
+          <a:lstStyle/>
+          <a:p>
+            <a:r>
+              <a:rPr lang="de-CH" smtClean="0"/>
+              <a:t>S.Bakocs, L.Stahel</a:t>
+            </a:r>
+            <a:endParaRPr lang="de-CH"/>
+          </a:p>
+        </p:txBody>
+      </p:sp>
+      <p:sp>
+        <p:nvSpPr>
+          <p:cNvPr id="5" name="Slide Number Placeholder 4"/>
+          <p:cNvSpPr>
+            <a:spLocks noGrp="1"/>
+          </p:cNvSpPr>
+          <p:nvPr>
+            <p:ph type="sldNum" sz="quarter" idx="12"/>
+          </p:nvPr>
+        </p:nvSpPr>
+        <p:spPr/>
+        <p:txBody>
+          <a:bodyPr/>
+          <a:lstStyle/>
+          <a:p>
+            <a:fld id="{0903F862-C958-4CC4-BEED-6508A7FB4281}" type="slidenum">
+              <a:rPr lang="de-CH" smtClean="0"/>
+              <a:t>14</a:t>
+            </a:fld>
+            <a:endParaRPr lang="de-CH"/>
+          </a:p>
+        </p:txBody>
+      </p:sp>
     </p:spTree>
     <p:extLst>
       <p:ext uri="{BB962C8B-B14F-4D97-AF65-F5344CB8AC3E}">
@@ -7510,6 +7985,75 @@
           <a:bodyPr/>
           <a:lstStyle/>
           <a:p>
+            <a:endParaRPr lang="de-CH"/>
+          </a:p>
+        </p:txBody>
+      </p:sp>
+      <p:sp>
+        <p:nvSpPr>
+          <p:cNvPr id="3" name="Date Placeholder 2"/>
+          <p:cNvSpPr>
+            <a:spLocks noGrp="1"/>
+          </p:cNvSpPr>
+          <p:nvPr>
+            <p:ph type="dt" sz="half" idx="10"/>
+          </p:nvPr>
+        </p:nvSpPr>
+        <p:spPr/>
+        <p:txBody>
+          <a:bodyPr/>
+          <a:lstStyle/>
+          <a:p>
+            <a:fld id="{6DA1A327-F847-4CFF-B30E-DB9DECE86ACE}" type="datetime1">
+              <a:rPr lang="de-CH" smtClean="0"/>
+              <a:t>04.01.2015</a:t>
+            </a:fld>
+            <a:endParaRPr lang="de-CH" dirty="0"/>
+          </a:p>
+        </p:txBody>
+      </p:sp>
+      <p:sp>
+        <p:nvSpPr>
+          <p:cNvPr id="5" name="Footer Placeholder 4"/>
+          <p:cNvSpPr>
+            <a:spLocks noGrp="1"/>
+          </p:cNvSpPr>
+          <p:nvPr>
+            <p:ph type="ftr" sz="quarter" idx="11"/>
+          </p:nvPr>
+        </p:nvSpPr>
+        <p:spPr/>
+        <p:txBody>
+          <a:bodyPr/>
+          <a:lstStyle/>
+          <a:p>
+            <a:r>
+              <a:rPr lang="de-CH" smtClean="0"/>
+              <a:t>S.Bakocs, L.Stahel</a:t>
+            </a:r>
+            <a:endParaRPr lang="de-CH"/>
+          </a:p>
+        </p:txBody>
+      </p:sp>
+      <p:sp>
+        <p:nvSpPr>
+          <p:cNvPr id="6" name="Slide Number Placeholder 5"/>
+          <p:cNvSpPr>
+            <a:spLocks noGrp="1"/>
+          </p:cNvSpPr>
+          <p:nvPr>
+            <p:ph type="sldNum" sz="quarter" idx="12"/>
+          </p:nvPr>
+        </p:nvSpPr>
+        <p:spPr/>
+        <p:txBody>
+          <a:bodyPr/>
+          <a:lstStyle/>
+          <a:p>
+            <a:fld id="{0903F862-C958-4CC4-BEED-6508A7FB4281}" type="slidenum">
+              <a:rPr lang="de-CH" smtClean="0"/>
+              <a:t>15</a:t>
+            </a:fld>
             <a:endParaRPr lang="de-CH"/>
           </a:p>
         </p:txBody>
@@ -7641,6 +8185,75 @@
           </a:p>
         </p:txBody>
       </p:sp>
+      <p:sp>
+        <p:nvSpPr>
+          <p:cNvPr id="2" name="Date Placeholder 1"/>
+          <p:cNvSpPr>
+            <a:spLocks noGrp="1"/>
+          </p:cNvSpPr>
+          <p:nvPr>
+            <p:ph type="dt" sz="half" idx="10"/>
+          </p:nvPr>
+        </p:nvSpPr>
+        <p:spPr/>
+        <p:txBody>
+          <a:bodyPr/>
+          <a:lstStyle/>
+          <a:p>
+            <a:fld id="{FF4F468F-8445-4135-84CD-691F3B663841}" type="datetime1">
+              <a:rPr lang="de-CH" smtClean="0"/>
+              <a:t>04.01.2015</a:t>
+            </a:fld>
+            <a:endParaRPr lang="de-CH" dirty="0"/>
+          </a:p>
+        </p:txBody>
+      </p:sp>
+      <p:sp>
+        <p:nvSpPr>
+          <p:cNvPr id="4" name="Footer Placeholder 3"/>
+          <p:cNvSpPr>
+            <a:spLocks noGrp="1"/>
+          </p:cNvSpPr>
+          <p:nvPr>
+            <p:ph type="ftr" sz="quarter" idx="11"/>
+          </p:nvPr>
+        </p:nvSpPr>
+        <p:spPr/>
+        <p:txBody>
+          <a:bodyPr/>
+          <a:lstStyle/>
+          <a:p>
+            <a:r>
+              <a:rPr lang="de-CH" smtClean="0"/>
+              <a:t>S.Bakocs, L.Stahel</a:t>
+            </a:r>
+            <a:endParaRPr lang="de-CH"/>
+          </a:p>
+        </p:txBody>
+      </p:sp>
+      <p:sp>
+        <p:nvSpPr>
+          <p:cNvPr id="5" name="Slide Number Placeholder 4"/>
+          <p:cNvSpPr>
+            <a:spLocks noGrp="1"/>
+          </p:cNvSpPr>
+          <p:nvPr>
+            <p:ph type="sldNum" sz="quarter" idx="12"/>
+          </p:nvPr>
+        </p:nvSpPr>
+        <p:spPr/>
+        <p:txBody>
+          <a:bodyPr/>
+          <a:lstStyle/>
+          <a:p>
+            <a:fld id="{0903F862-C958-4CC4-BEED-6508A7FB4281}" type="slidenum">
+              <a:rPr lang="de-CH" smtClean="0"/>
+              <a:t>16</a:t>
+            </a:fld>
+            <a:endParaRPr lang="de-CH"/>
+          </a:p>
+        </p:txBody>
+      </p:sp>
       <p:pic>
         <p:nvPicPr>
           <p:cNvPr id="105" name="Shape 105"/>
@@ -7768,6 +8381,75 @@
           </a:p>
         </p:txBody>
       </p:sp>
+      <p:sp>
+        <p:nvSpPr>
+          <p:cNvPr id="2" name="Date Placeholder 1"/>
+          <p:cNvSpPr>
+            <a:spLocks noGrp="1"/>
+          </p:cNvSpPr>
+          <p:nvPr>
+            <p:ph type="dt" sz="half" idx="10"/>
+          </p:nvPr>
+        </p:nvSpPr>
+        <p:spPr/>
+        <p:txBody>
+          <a:bodyPr/>
+          <a:lstStyle/>
+          <a:p>
+            <a:fld id="{2FC2963E-5256-433F-B063-FB241407955A}" type="datetime1">
+              <a:rPr lang="de-CH" smtClean="0"/>
+              <a:t>04.01.2015</a:t>
+            </a:fld>
+            <a:endParaRPr lang="de-CH" dirty="0"/>
+          </a:p>
+        </p:txBody>
+      </p:sp>
+      <p:sp>
+        <p:nvSpPr>
+          <p:cNvPr id="4" name="Footer Placeholder 3"/>
+          <p:cNvSpPr>
+            <a:spLocks noGrp="1"/>
+          </p:cNvSpPr>
+          <p:nvPr>
+            <p:ph type="ftr" sz="quarter" idx="11"/>
+          </p:nvPr>
+        </p:nvSpPr>
+        <p:spPr/>
+        <p:txBody>
+          <a:bodyPr/>
+          <a:lstStyle/>
+          <a:p>
+            <a:r>
+              <a:rPr lang="de-CH" smtClean="0"/>
+              <a:t>S.Bakocs, L.Stahel</a:t>
+            </a:r>
+            <a:endParaRPr lang="de-CH"/>
+          </a:p>
+        </p:txBody>
+      </p:sp>
+      <p:sp>
+        <p:nvSpPr>
+          <p:cNvPr id="5" name="Slide Number Placeholder 4"/>
+          <p:cNvSpPr>
+            <a:spLocks noGrp="1"/>
+          </p:cNvSpPr>
+          <p:nvPr>
+            <p:ph type="sldNum" sz="quarter" idx="12"/>
+          </p:nvPr>
+        </p:nvSpPr>
+        <p:spPr/>
+        <p:txBody>
+          <a:bodyPr/>
+          <a:lstStyle/>
+          <a:p>
+            <a:fld id="{0903F862-C958-4CC4-BEED-6508A7FB4281}" type="slidenum">
+              <a:rPr lang="de-CH" smtClean="0"/>
+              <a:t>17</a:t>
+            </a:fld>
+            <a:endParaRPr lang="de-CH"/>
+          </a:p>
+        </p:txBody>
+      </p:sp>
     </p:spTree>
     <p:extLst>
       <p:ext uri="{BB962C8B-B14F-4D97-AF65-F5344CB8AC3E}">
@@ -7867,6 +8549,75 @@
           </a:p>
         </p:txBody>
       </p:sp>
+      <p:sp>
+        <p:nvSpPr>
+          <p:cNvPr id="2" name="Date Placeholder 1"/>
+          <p:cNvSpPr>
+            <a:spLocks noGrp="1"/>
+          </p:cNvSpPr>
+          <p:nvPr>
+            <p:ph type="dt" sz="half" idx="10"/>
+          </p:nvPr>
+        </p:nvSpPr>
+        <p:spPr/>
+        <p:txBody>
+          <a:bodyPr/>
+          <a:lstStyle/>
+          <a:p>
+            <a:fld id="{B1F369AF-2F04-47F3-8847-6D4C6DB48DA1}" type="datetime1">
+              <a:rPr lang="de-CH" smtClean="0"/>
+              <a:t>04.01.2015</a:t>
+            </a:fld>
+            <a:endParaRPr lang="de-CH" dirty="0"/>
+          </a:p>
+        </p:txBody>
+      </p:sp>
+      <p:sp>
+        <p:nvSpPr>
+          <p:cNvPr id="4" name="Footer Placeholder 3"/>
+          <p:cNvSpPr>
+            <a:spLocks noGrp="1"/>
+          </p:cNvSpPr>
+          <p:nvPr>
+            <p:ph type="ftr" sz="quarter" idx="11"/>
+          </p:nvPr>
+        </p:nvSpPr>
+        <p:spPr/>
+        <p:txBody>
+          <a:bodyPr/>
+          <a:lstStyle/>
+          <a:p>
+            <a:r>
+              <a:rPr lang="de-CH" smtClean="0"/>
+              <a:t>S.Bakocs, L.Stahel</a:t>
+            </a:r>
+            <a:endParaRPr lang="de-CH"/>
+          </a:p>
+        </p:txBody>
+      </p:sp>
+      <p:sp>
+        <p:nvSpPr>
+          <p:cNvPr id="5" name="Slide Number Placeholder 4"/>
+          <p:cNvSpPr>
+            <a:spLocks noGrp="1"/>
+          </p:cNvSpPr>
+          <p:nvPr>
+            <p:ph type="sldNum" sz="quarter" idx="12"/>
+          </p:nvPr>
+        </p:nvSpPr>
+        <p:spPr/>
+        <p:txBody>
+          <a:bodyPr/>
+          <a:lstStyle/>
+          <a:p>
+            <a:fld id="{0903F862-C958-4CC4-BEED-6508A7FB4281}" type="slidenum">
+              <a:rPr lang="de-CH" smtClean="0"/>
+              <a:t>18</a:t>
+            </a:fld>
+            <a:endParaRPr lang="de-CH"/>
+          </a:p>
+        </p:txBody>
+      </p:sp>
     </p:spTree>
     <p:extLst>
       <p:ext uri="{BB962C8B-B14F-4D97-AF65-F5344CB8AC3E}">
@@ -7966,6 +8717,75 @@
           </a:p>
         </p:txBody>
       </p:sp>
+      <p:sp>
+        <p:nvSpPr>
+          <p:cNvPr id="2" name="Date Placeholder 1"/>
+          <p:cNvSpPr>
+            <a:spLocks noGrp="1"/>
+          </p:cNvSpPr>
+          <p:nvPr>
+            <p:ph type="dt" sz="half" idx="10"/>
+          </p:nvPr>
+        </p:nvSpPr>
+        <p:spPr/>
+        <p:txBody>
+          <a:bodyPr/>
+          <a:lstStyle/>
+          <a:p>
+            <a:fld id="{E836C588-0F84-4514-B07F-1966BDF65C85}" type="datetime1">
+              <a:rPr lang="de-CH" smtClean="0"/>
+              <a:t>04.01.2015</a:t>
+            </a:fld>
+            <a:endParaRPr lang="de-CH" dirty="0"/>
+          </a:p>
+        </p:txBody>
+      </p:sp>
+      <p:sp>
+        <p:nvSpPr>
+          <p:cNvPr id="4" name="Footer Placeholder 3"/>
+          <p:cNvSpPr>
+            <a:spLocks noGrp="1"/>
+          </p:cNvSpPr>
+          <p:nvPr>
+            <p:ph type="ftr" sz="quarter" idx="11"/>
+          </p:nvPr>
+        </p:nvSpPr>
+        <p:spPr/>
+        <p:txBody>
+          <a:bodyPr/>
+          <a:lstStyle/>
+          <a:p>
+            <a:r>
+              <a:rPr lang="de-CH" smtClean="0"/>
+              <a:t>S.Bakocs, L.Stahel</a:t>
+            </a:r>
+            <a:endParaRPr lang="de-CH"/>
+          </a:p>
+        </p:txBody>
+      </p:sp>
+      <p:sp>
+        <p:nvSpPr>
+          <p:cNvPr id="5" name="Slide Number Placeholder 4"/>
+          <p:cNvSpPr>
+            <a:spLocks noGrp="1"/>
+          </p:cNvSpPr>
+          <p:nvPr>
+            <p:ph type="sldNum" sz="quarter" idx="12"/>
+          </p:nvPr>
+        </p:nvSpPr>
+        <p:spPr/>
+        <p:txBody>
+          <a:bodyPr/>
+          <a:lstStyle/>
+          <a:p>
+            <a:fld id="{0903F862-C958-4CC4-BEED-6508A7FB4281}" type="slidenum">
+              <a:rPr lang="de-CH" smtClean="0"/>
+              <a:t>19</a:t>
+            </a:fld>
+            <a:endParaRPr lang="de-CH"/>
+          </a:p>
+        </p:txBody>
+      </p:sp>
     </p:spTree>
     <p:extLst>
       <p:ext uri="{BB962C8B-B14F-4D97-AF65-F5344CB8AC3E}">
@@ -8096,6 +8916,75 @@
           </a:p>
         </p:txBody>
       </p:sp>
+      <p:sp>
+        <p:nvSpPr>
+          <p:cNvPr id="4" name="Date Placeholder 3"/>
+          <p:cNvSpPr>
+            <a:spLocks noGrp="1"/>
+          </p:cNvSpPr>
+          <p:nvPr>
+            <p:ph type="dt" sz="half" idx="10"/>
+          </p:nvPr>
+        </p:nvSpPr>
+        <p:spPr/>
+        <p:txBody>
+          <a:bodyPr/>
+          <a:lstStyle/>
+          <a:p>
+            <a:fld id="{2292A1C0-826A-4976-87E6-E70BBB8825A6}" type="datetime1">
+              <a:rPr lang="de-CH" smtClean="0"/>
+              <a:t>04.01.2015</a:t>
+            </a:fld>
+            <a:endParaRPr lang="de-CH" dirty="0"/>
+          </a:p>
+        </p:txBody>
+      </p:sp>
+      <p:sp>
+        <p:nvSpPr>
+          <p:cNvPr id="6" name="Footer Placeholder 5"/>
+          <p:cNvSpPr>
+            <a:spLocks noGrp="1"/>
+          </p:cNvSpPr>
+          <p:nvPr>
+            <p:ph type="ftr" sz="quarter" idx="11"/>
+          </p:nvPr>
+        </p:nvSpPr>
+        <p:spPr/>
+        <p:txBody>
+          <a:bodyPr/>
+          <a:lstStyle/>
+          <a:p>
+            <a:r>
+              <a:rPr lang="de-CH" smtClean="0"/>
+              <a:t>S.Bakocs, L.Stahel</a:t>
+            </a:r>
+            <a:endParaRPr lang="de-CH"/>
+          </a:p>
+        </p:txBody>
+      </p:sp>
+      <p:sp>
+        <p:nvSpPr>
+          <p:cNvPr id="7" name="Slide Number Placeholder 6"/>
+          <p:cNvSpPr>
+            <a:spLocks noGrp="1"/>
+          </p:cNvSpPr>
+          <p:nvPr>
+            <p:ph type="sldNum" sz="quarter" idx="12"/>
+          </p:nvPr>
+        </p:nvSpPr>
+        <p:spPr/>
+        <p:txBody>
+          <a:bodyPr/>
+          <a:lstStyle/>
+          <a:p>
+            <a:fld id="{0903F862-C958-4CC4-BEED-6508A7FB4281}" type="slidenum">
+              <a:rPr lang="de-CH" smtClean="0"/>
+              <a:t>2</a:t>
+            </a:fld>
+            <a:endParaRPr lang="de-CH"/>
+          </a:p>
+        </p:txBody>
+      </p:sp>
     </p:spTree>
     <p:extLst>
       <p:ext uri="{BB962C8B-B14F-4D97-AF65-F5344CB8AC3E}">
@@ -8189,6 +9078,75 @@
               <a:rPr lang="en"/>
               <a:t>webkitRequestAnimationFrame();</a:t>
             </a:r>
+          </a:p>
+        </p:txBody>
+      </p:sp>
+      <p:sp>
+        <p:nvSpPr>
+          <p:cNvPr id="2" name="Date Placeholder 1"/>
+          <p:cNvSpPr>
+            <a:spLocks noGrp="1"/>
+          </p:cNvSpPr>
+          <p:nvPr>
+            <p:ph type="dt" sz="half" idx="10"/>
+          </p:nvPr>
+        </p:nvSpPr>
+        <p:spPr/>
+        <p:txBody>
+          <a:bodyPr/>
+          <a:lstStyle/>
+          <a:p>
+            <a:fld id="{DEF06020-5C6C-424D-8DD0-36743B0C1C7A}" type="datetime1">
+              <a:rPr lang="de-CH" smtClean="0"/>
+              <a:t>04.01.2015</a:t>
+            </a:fld>
+            <a:endParaRPr lang="de-CH" dirty="0"/>
+          </a:p>
+        </p:txBody>
+      </p:sp>
+      <p:sp>
+        <p:nvSpPr>
+          <p:cNvPr id="4" name="Footer Placeholder 3"/>
+          <p:cNvSpPr>
+            <a:spLocks noGrp="1"/>
+          </p:cNvSpPr>
+          <p:nvPr>
+            <p:ph type="ftr" sz="quarter" idx="11"/>
+          </p:nvPr>
+        </p:nvSpPr>
+        <p:spPr/>
+        <p:txBody>
+          <a:bodyPr/>
+          <a:lstStyle/>
+          <a:p>
+            <a:r>
+              <a:rPr lang="de-CH" smtClean="0"/>
+              <a:t>S.Bakocs, L.Stahel</a:t>
+            </a:r>
+            <a:endParaRPr lang="de-CH"/>
+          </a:p>
+        </p:txBody>
+      </p:sp>
+      <p:sp>
+        <p:nvSpPr>
+          <p:cNvPr id="5" name="Slide Number Placeholder 4"/>
+          <p:cNvSpPr>
+            <a:spLocks noGrp="1"/>
+          </p:cNvSpPr>
+          <p:nvPr>
+            <p:ph type="sldNum" sz="quarter" idx="12"/>
+          </p:nvPr>
+        </p:nvSpPr>
+        <p:spPr/>
+        <p:txBody>
+          <a:bodyPr/>
+          <a:lstStyle/>
+          <a:p>
+            <a:fld id="{0903F862-C958-4CC4-BEED-6508A7FB4281}" type="slidenum">
+              <a:rPr lang="de-CH" smtClean="0"/>
+              <a:t>20</a:t>
+            </a:fld>
+            <a:endParaRPr lang="de-CH"/>
           </a:p>
         </p:txBody>
       </p:sp>
@@ -8275,6 +9233,75 @@
           <a:bodyPr/>
           <a:lstStyle/>
           <a:p>
+            <a:endParaRPr lang="de-CH"/>
+          </a:p>
+        </p:txBody>
+      </p:sp>
+      <p:sp>
+        <p:nvSpPr>
+          <p:cNvPr id="3" name="Date Placeholder 2"/>
+          <p:cNvSpPr>
+            <a:spLocks noGrp="1"/>
+          </p:cNvSpPr>
+          <p:nvPr>
+            <p:ph type="dt" sz="half" idx="10"/>
+          </p:nvPr>
+        </p:nvSpPr>
+        <p:spPr/>
+        <p:txBody>
+          <a:bodyPr/>
+          <a:lstStyle/>
+          <a:p>
+            <a:fld id="{2B35F776-4D4F-4DC1-87CE-F2691DC11DDD}" type="datetime1">
+              <a:rPr lang="de-CH" smtClean="0"/>
+              <a:t>04.01.2015</a:t>
+            </a:fld>
+            <a:endParaRPr lang="de-CH" dirty="0"/>
+          </a:p>
+        </p:txBody>
+      </p:sp>
+      <p:sp>
+        <p:nvSpPr>
+          <p:cNvPr id="5" name="Footer Placeholder 4"/>
+          <p:cNvSpPr>
+            <a:spLocks noGrp="1"/>
+          </p:cNvSpPr>
+          <p:nvPr>
+            <p:ph type="ftr" sz="quarter" idx="11"/>
+          </p:nvPr>
+        </p:nvSpPr>
+        <p:spPr/>
+        <p:txBody>
+          <a:bodyPr/>
+          <a:lstStyle/>
+          <a:p>
+            <a:r>
+              <a:rPr lang="de-CH" smtClean="0"/>
+              <a:t>S.Bakocs, L.Stahel</a:t>
+            </a:r>
+            <a:endParaRPr lang="de-CH"/>
+          </a:p>
+        </p:txBody>
+      </p:sp>
+      <p:sp>
+        <p:nvSpPr>
+          <p:cNvPr id="6" name="Slide Number Placeholder 5"/>
+          <p:cNvSpPr>
+            <a:spLocks noGrp="1"/>
+          </p:cNvSpPr>
+          <p:nvPr>
+            <p:ph type="sldNum" sz="quarter" idx="12"/>
+          </p:nvPr>
+        </p:nvSpPr>
+        <p:spPr/>
+        <p:txBody>
+          <a:bodyPr/>
+          <a:lstStyle/>
+          <a:p>
+            <a:fld id="{0903F862-C958-4CC4-BEED-6508A7FB4281}" type="slidenum">
+              <a:rPr lang="de-CH" smtClean="0"/>
+              <a:t>21</a:t>
+            </a:fld>
             <a:endParaRPr lang="de-CH"/>
           </a:p>
         </p:txBody>
@@ -8477,6 +9504,30 @@
           </a:p>
         </p:txBody>
       </p:sp>
+      <p:sp>
+        <p:nvSpPr>
+          <p:cNvPr id="3" name="Slide Number Placeholder 2"/>
+          <p:cNvSpPr>
+            <a:spLocks noGrp="1"/>
+          </p:cNvSpPr>
+          <p:nvPr>
+            <p:ph type="sldNum" idx="12"/>
+          </p:nvPr>
+        </p:nvSpPr>
+        <p:spPr/>
+        <p:txBody>
+          <a:bodyPr/>
+          <a:lstStyle/>
+          <a:p>
+            <a:fld id="{00000000-1234-1234-1234-123412341234}" type="slidenum">
+              <a:rPr lang="en" smtClean="0"/>
+              <a:pPr/>
+              <a:t>22</a:t>
+            </a:fld>
+            <a:endParaRPr lang="en"/>
+          </a:p>
+        </p:txBody>
+      </p:sp>
       <p:pic>
         <p:nvPicPr>
           <p:cNvPr id="142" name="Shape 142"/>
@@ -8645,6 +9696,75 @@
           <a:p>
             <a:pPr lvl="1"/>
             <a:endParaRPr lang="de-CH" dirty="0"/>
+          </a:p>
+        </p:txBody>
+      </p:sp>
+      <p:sp>
+        <p:nvSpPr>
+          <p:cNvPr id="4" name="Date Placeholder 3"/>
+          <p:cNvSpPr>
+            <a:spLocks noGrp="1"/>
+          </p:cNvSpPr>
+          <p:nvPr>
+            <p:ph type="dt" sz="half" idx="10"/>
+          </p:nvPr>
+        </p:nvSpPr>
+        <p:spPr/>
+        <p:txBody>
+          <a:bodyPr/>
+          <a:lstStyle/>
+          <a:p>
+            <a:fld id="{3B2BF671-843E-45C7-8EE5-947CF3F12935}" type="datetime1">
+              <a:rPr lang="de-CH" smtClean="0"/>
+              <a:t>04.01.2015</a:t>
+            </a:fld>
+            <a:endParaRPr lang="de-CH" dirty="0"/>
+          </a:p>
+        </p:txBody>
+      </p:sp>
+      <p:sp>
+        <p:nvSpPr>
+          <p:cNvPr id="6" name="Footer Placeholder 5"/>
+          <p:cNvSpPr>
+            <a:spLocks noGrp="1"/>
+          </p:cNvSpPr>
+          <p:nvPr>
+            <p:ph type="ftr" sz="quarter" idx="11"/>
+          </p:nvPr>
+        </p:nvSpPr>
+        <p:spPr/>
+        <p:txBody>
+          <a:bodyPr/>
+          <a:lstStyle/>
+          <a:p>
+            <a:r>
+              <a:rPr lang="de-CH" smtClean="0"/>
+              <a:t>S.Bakocs, L.Stahel</a:t>
+            </a:r>
+            <a:endParaRPr lang="de-CH"/>
+          </a:p>
+        </p:txBody>
+      </p:sp>
+      <p:sp>
+        <p:nvSpPr>
+          <p:cNvPr id="8" name="Slide Number Placeholder 7"/>
+          <p:cNvSpPr>
+            <a:spLocks noGrp="1"/>
+          </p:cNvSpPr>
+          <p:nvPr>
+            <p:ph type="sldNum" sz="quarter" idx="12"/>
+          </p:nvPr>
+        </p:nvSpPr>
+        <p:spPr/>
+        <p:txBody>
+          <a:bodyPr/>
+          <a:lstStyle/>
+          <a:p>
+            <a:fld id="{0903F862-C958-4CC4-BEED-6508A7FB4281}" type="slidenum">
+              <a:rPr lang="de-CH" smtClean="0"/>
+              <a:t>23</a:t>
+            </a:fld>
+            <a:endParaRPr lang="de-CH"/>
           </a:p>
         </p:txBody>
       </p:sp>
@@ -8977,13 +10097,78 @@
           <a:p>
             <a:r>
               <a:rPr lang="de-CH" dirty="0" smtClean="0"/>
-              <a:t>Varianten</a:t>
-            </a:r>
-            <a:r>
-              <a:rPr lang="de-CH" dirty="0" smtClean="0"/>
-              <a:t>, Lösungen, Probleme, Erkenntnisse</a:t>
+              <a:t>Varianten, Lösungen, Probleme, Erkenntnisse</a:t>
             </a:r>
             <a:endParaRPr lang="de-CH" dirty="0"/>
+          </a:p>
+        </p:txBody>
+      </p:sp>
+      <p:sp>
+        <p:nvSpPr>
+          <p:cNvPr id="4" name="Date Placeholder 3"/>
+          <p:cNvSpPr>
+            <a:spLocks noGrp="1"/>
+          </p:cNvSpPr>
+          <p:nvPr>
+            <p:ph type="dt" sz="half" idx="10"/>
+          </p:nvPr>
+        </p:nvSpPr>
+        <p:spPr/>
+        <p:txBody>
+          <a:bodyPr/>
+          <a:lstStyle/>
+          <a:p>
+            <a:fld id="{2B011CAF-DD1A-4BE6-B2F7-AB3FC568E8C9}" type="datetime1">
+              <a:rPr lang="de-CH" smtClean="0"/>
+              <a:t>04.01.2015</a:t>
+            </a:fld>
+            <a:endParaRPr lang="de-CH"/>
+          </a:p>
+        </p:txBody>
+      </p:sp>
+      <p:sp>
+        <p:nvSpPr>
+          <p:cNvPr id="6" name="Footer Placeholder 5"/>
+          <p:cNvSpPr>
+            <a:spLocks noGrp="1"/>
+          </p:cNvSpPr>
+          <p:nvPr>
+            <p:ph type="ftr" sz="quarter" idx="11"/>
+          </p:nvPr>
+        </p:nvSpPr>
+        <p:spPr/>
+        <p:txBody>
+          <a:bodyPr/>
+          <a:lstStyle/>
+          <a:p>
+            <a:r>
+              <a:rPr lang="de-CH" smtClean="0"/>
+              <a:t>S.Bakocs, L.Stahel</a:t>
+            </a:r>
+            <a:endParaRPr lang="de-CH" dirty="0"/>
+          </a:p>
+        </p:txBody>
+      </p:sp>
+      <p:sp>
+        <p:nvSpPr>
+          <p:cNvPr id="7" name="Slide Number Placeholder 6"/>
+          <p:cNvSpPr>
+            <a:spLocks noGrp="1"/>
+          </p:cNvSpPr>
+          <p:nvPr>
+            <p:ph type="sldNum" sz="quarter" idx="12"/>
+          </p:nvPr>
+        </p:nvSpPr>
+        <p:spPr/>
+        <p:txBody>
+          <a:bodyPr/>
+          <a:lstStyle/>
+          <a:p>
+            <a:fld id="{0903F862-C958-4CC4-BEED-6508A7FB4281}" type="slidenum">
+              <a:rPr lang="de-CH" smtClean="0"/>
+              <a:t>24</a:t>
+            </a:fld>
+            <a:endParaRPr lang="de-CH"/>
           </a:p>
         </p:txBody>
       </p:sp>
@@ -9174,6 +10359,75 @@
               <a:t>Komplexe umsetzung der Überwachung durch Server</a:t>
             </a:r>
             <a:endParaRPr lang="en" dirty="0"/>
+          </a:p>
+        </p:txBody>
+      </p:sp>
+      <p:sp>
+        <p:nvSpPr>
+          <p:cNvPr id="2" name="Date Placeholder 1"/>
+          <p:cNvSpPr>
+            <a:spLocks noGrp="1"/>
+          </p:cNvSpPr>
+          <p:nvPr>
+            <p:ph type="dt" sz="half" idx="10"/>
+          </p:nvPr>
+        </p:nvSpPr>
+        <p:spPr/>
+        <p:txBody>
+          <a:bodyPr/>
+          <a:lstStyle/>
+          <a:p>
+            <a:fld id="{8D3A3C4C-E792-42D6-AEA9-09A0B786EFEB}" type="datetime1">
+              <a:rPr lang="de-CH" smtClean="0"/>
+              <a:t>04.01.2015</a:t>
+            </a:fld>
+            <a:endParaRPr lang="de-CH" dirty="0"/>
+          </a:p>
+        </p:txBody>
+      </p:sp>
+      <p:sp>
+        <p:nvSpPr>
+          <p:cNvPr id="4" name="Footer Placeholder 3"/>
+          <p:cNvSpPr>
+            <a:spLocks noGrp="1"/>
+          </p:cNvSpPr>
+          <p:nvPr>
+            <p:ph type="ftr" sz="quarter" idx="11"/>
+          </p:nvPr>
+        </p:nvSpPr>
+        <p:spPr/>
+        <p:txBody>
+          <a:bodyPr/>
+          <a:lstStyle/>
+          <a:p>
+            <a:r>
+              <a:rPr lang="de-CH" smtClean="0"/>
+              <a:t>S.Bakocs, L.Stahel</a:t>
+            </a:r>
+            <a:endParaRPr lang="de-CH"/>
+          </a:p>
+        </p:txBody>
+      </p:sp>
+      <p:sp>
+        <p:nvSpPr>
+          <p:cNvPr id="5" name="Slide Number Placeholder 4"/>
+          <p:cNvSpPr>
+            <a:spLocks noGrp="1"/>
+          </p:cNvSpPr>
+          <p:nvPr>
+            <p:ph type="sldNum" sz="quarter" idx="12"/>
+          </p:nvPr>
+        </p:nvSpPr>
+        <p:spPr/>
+        <p:txBody>
+          <a:bodyPr/>
+          <a:lstStyle/>
+          <a:p>
+            <a:fld id="{0903F862-C958-4CC4-BEED-6508A7FB4281}" type="slidenum">
+              <a:rPr lang="de-CH" smtClean="0"/>
+              <a:t>25</a:t>
+            </a:fld>
+            <a:endParaRPr lang="de-CH"/>
           </a:p>
         </p:txBody>
       </p:sp>
@@ -9269,6 +10523,75 @@
           </a:xfrm>
         </p:spPr>
       </p:pic>
+      <p:sp>
+        <p:nvSpPr>
+          <p:cNvPr id="3" name="Date Placeholder 2"/>
+          <p:cNvSpPr>
+            <a:spLocks noGrp="1"/>
+          </p:cNvSpPr>
+          <p:nvPr>
+            <p:ph type="dt" sz="half" idx="10"/>
+          </p:nvPr>
+        </p:nvSpPr>
+        <p:spPr/>
+        <p:txBody>
+          <a:bodyPr/>
+          <a:lstStyle/>
+          <a:p>
+            <a:fld id="{CD7F7AF0-384F-47C3-BA65-D3243D51F1F4}" type="datetime1">
+              <a:rPr lang="de-CH" smtClean="0"/>
+              <a:t>04.01.2015</a:t>
+            </a:fld>
+            <a:endParaRPr lang="de-CH" dirty="0"/>
+          </a:p>
+        </p:txBody>
+      </p:sp>
+      <p:sp>
+        <p:nvSpPr>
+          <p:cNvPr id="6" name="Footer Placeholder 5"/>
+          <p:cNvSpPr>
+            <a:spLocks noGrp="1"/>
+          </p:cNvSpPr>
+          <p:nvPr>
+            <p:ph type="ftr" sz="quarter" idx="11"/>
+          </p:nvPr>
+        </p:nvSpPr>
+        <p:spPr/>
+        <p:txBody>
+          <a:bodyPr/>
+          <a:lstStyle/>
+          <a:p>
+            <a:r>
+              <a:rPr lang="de-CH" smtClean="0"/>
+              <a:t>S.Bakocs, L.Stahel</a:t>
+            </a:r>
+            <a:endParaRPr lang="de-CH"/>
+          </a:p>
+        </p:txBody>
+      </p:sp>
+      <p:sp>
+        <p:nvSpPr>
+          <p:cNvPr id="7" name="Slide Number Placeholder 6"/>
+          <p:cNvSpPr>
+            <a:spLocks noGrp="1"/>
+          </p:cNvSpPr>
+          <p:nvPr>
+            <p:ph type="sldNum" sz="quarter" idx="12"/>
+          </p:nvPr>
+        </p:nvSpPr>
+        <p:spPr/>
+        <p:txBody>
+          <a:bodyPr/>
+          <a:lstStyle/>
+          <a:p>
+            <a:fld id="{0903F862-C958-4CC4-BEED-6508A7FB4281}" type="slidenum">
+              <a:rPr lang="de-CH" smtClean="0"/>
+              <a:t>26</a:t>
+            </a:fld>
+            <a:endParaRPr lang="de-CH"/>
+          </a:p>
+        </p:txBody>
+      </p:sp>
     </p:spTree>
     <p:extLst>
       <p:ext uri="{BB962C8B-B14F-4D97-AF65-F5344CB8AC3E}">
@@ -9358,13 +10681,7 @@
               <a:rPr lang="de-CH" dirty="0" smtClean="0">
                 <a:sym typeface="Wingdings" panose="05000000000000000000" pitchFamily="2" charset="2"/>
               </a:rPr>
-              <a:t> Weitergabe der Kollisionsinformation an </a:t>
-            </a:r>
-            <a:r>
-              <a:rPr lang="de-CH" dirty="0" smtClean="0">
-                <a:sym typeface="Wingdings" panose="05000000000000000000" pitchFamily="2" charset="2"/>
-              </a:rPr>
-              <a:t>Clients</a:t>
+              <a:t> Weitergabe der Kollisionsinformation an Clients</a:t>
             </a:r>
           </a:p>
           <a:p>
@@ -9375,9 +10692,6 @@
               </a:rPr>
               <a:t>Überprüfung ob das Spiel vorbei ist</a:t>
             </a:r>
-            <a:endParaRPr lang="de-CH" dirty="0" smtClean="0">
-              <a:sym typeface="Wingdings" panose="05000000000000000000" pitchFamily="2" charset="2"/>
-            </a:endParaRPr>
           </a:p>
           <a:p>
             <a:r>
@@ -9395,6 +10709,75 @@
               <a:t>Bei Spielende die Clients informieren</a:t>
             </a:r>
             <a:endParaRPr lang="de-CH" dirty="0"/>
+          </a:p>
+        </p:txBody>
+      </p:sp>
+      <p:sp>
+        <p:nvSpPr>
+          <p:cNvPr id="4" name="Date Placeholder 3"/>
+          <p:cNvSpPr>
+            <a:spLocks noGrp="1"/>
+          </p:cNvSpPr>
+          <p:nvPr>
+            <p:ph type="dt" sz="half" idx="10"/>
+          </p:nvPr>
+        </p:nvSpPr>
+        <p:spPr/>
+        <p:txBody>
+          <a:bodyPr/>
+          <a:lstStyle/>
+          <a:p>
+            <a:fld id="{86ACA5D5-EA62-429C-BC13-7C74C2A46809}" type="datetime1">
+              <a:rPr lang="de-CH" smtClean="0"/>
+              <a:t>04.01.2015</a:t>
+            </a:fld>
+            <a:endParaRPr lang="de-CH" dirty="0"/>
+          </a:p>
+        </p:txBody>
+      </p:sp>
+      <p:sp>
+        <p:nvSpPr>
+          <p:cNvPr id="6" name="Footer Placeholder 5"/>
+          <p:cNvSpPr>
+            <a:spLocks noGrp="1"/>
+          </p:cNvSpPr>
+          <p:nvPr>
+            <p:ph type="ftr" sz="quarter" idx="11"/>
+          </p:nvPr>
+        </p:nvSpPr>
+        <p:spPr/>
+        <p:txBody>
+          <a:bodyPr/>
+          <a:lstStyle/>
+          <a:p>
+            <a:r>
+              <a:rPr lang="de-CH" smtClean="0"/>
+              <a:t>S.Bakocs, L.Stahel</a:t>
+            </a:r>
+            <a:endParaRPr lang="de-CH"/>
+          </a:p>
+        </p:txBody>
+      </p:sp>
+      <p:sp>
+        <p:nvSpPr>
+          <p:cNvPr id="7" name="Slide Number Placeholder 6"/>
+          <p:cNvSpPr>
+            <a:spLocks noGrp="1"/>
+          </p:cNvSpPr>
+          <p:nvPr>
+            <p:ph type="sldNum" sz="quarter" idx="12"/>
+          </p:nvPr>
+        </p:nvSpPr>
+        <p:spPr/>
+        <p:txBody>
+          <a:bodyPr/>
+          <a:lstStyle/>
+          <a:p>
+            <a:fld id="{0903F862-C958-4CC4-BEED-6508A7FB4281}" type="slidenum">
+              <a:rPr lang="de-CH" smtClean="0"/>
+              <a:t>27</a:t>
+            </a:fld>
+            <a:endParaRPr lang="de-CH"/>
           </a:p>
         </p:txBody>
       </p:sp>
@@ -9487,6 +10870,75 @@
           </a:xfrm>
         </p:spPr>
       </p:pic>
+      <p:sp>
+        <p:nvSpPr>
+          <p:cNvPr id="3" name="Date Placeholder 2"/>
+          <p:cNvSpPr>
+            <a:spLocks noGrp="1"/>
+          </p:cNvSpPr>
+          <p:nvPr>
+            <p:ph type="dt" sz="half" idx="10"/>
+          </p:nvPr>
+        </p:nvSpPr>
+        <p:spPr/>
+        <p:txBody>
+          <a:bodyPr/>
+          <a:lstStyle/>
+          <a:p>
+            <a:fld id="{D69107D7-5842-4053-AEB7-A34C09C7F219}" type="datetime1">
+              <a:rPr lang="de-CH" smtClean="0"/>
+              <a:t>04.01.2015</a:t>
+            </a:fld>
+            <a:endParaRPr lang="de-CH" dirty="0"/>
+          </a:p>
+        </p:txBody>
+      </p:sp>
+      <p:sp>
+        <p:nvSpPr>
+          <p:cNvPr id="5" name="Footer Placeholder 4"/>
+          <p:cNvSpPr>
+            <a:spLocks noGrp="1"/>
+          </p:cNvSpPr>
+          <p:nvPr>
+            <p:ph type="ftr" sz="quarter" idx="11"/>
+          </p:nvPr>
+        </p:nvSpPr>
+        <p:spPr/>
+        <p:txBody>
+          <a:bodyPr/>
+          <a:lstStyle/>
+          <a:p>
+            <a:r>
+              <a:rPr lang="de-CH" smtClean="0"/>
+              <a:t>S.Bakocs, L.Stahel</a:t>
+            </a:r>
+            <a:endParaRPr lang="de-CH"/>
+          </a:p>
+        </p:txBody>
+      </p:sp>
+      <p:sp>
+        <p:nvSpPr>
+          <p:cNvPr id="6" name="Slide Number Placeholder 5"/>
+          <p:cNvSpPr>
+            <a:spLocks noGrp="1"/>
+          </p:cNvSpPr>
+          <p:nvPr>
+            <p:ph type="sldNum" sz="quarter" idx="12"/>
+          </p:nvPr>
+        </p:nvSpPr>
+        <p:spPr/>
+        <p:txBody>
+          <a:bodyPr/>
+          <a:lstStyle/>
+          <a:p>
+            <a:fld id="{0903F862-C958-4CC4-BEED-6508A7FB4281}" type="slidenum">
+              <a:rPr lang="de-CH" smtClean="0"/>
+              <a:t>28</a:t>
+            </a:fld>
+            <a:endParaRPr lang="de-CH"/>
+          </a:p>
+        </p:txBody>
+      </p:sp>
     </p:spTree>
     <p:extLst>
       <p:ext uri="{BB962C8B-B14F-4D97-AF65-F5344CB8AC3E}">
@@ -9698,6 +11150,75 @@
           </a:p>
         </p:txBody>
       </p:sp>
+      <p:sp>
+        <p:nvSpPr>
+          <p:cNvPr id="3" name="Date Placeholder 2"/>
+          <p:cNvSpPr>
+            <a:spLocks noGrp="1"/>
+          </p:cNvSpPr>
+          <p:nvPr>
+            <p:ph type="dt" sz="half" idx="10"/>
+          </p:nvPr>
+        </p:nvSpPr>
+        <p:spPr/>
+        <p:txBody>
+          <a:bodyPr/>
+          <a:lstStyle/>
+          <a:p>
+            <a:fld id="{BD1A471C-F79E-4587-85AE-F48625D03AF8}" type="datetime1">
+              <a:rPr lang="de-CH" smtClean="0"/>
+              <a:t>04.01.2015</a:t>
+            </a:fld>
+            <a:endParaRPr lang="de-CH"/>
+          </a:p>
+        </p:txBody>
+      </p:sp>
+      <p:sp>
+        <p:nvSpPr>
+          <p:cNvPr id="6" name="Footer Placeholder 5"/>
+          <p:cNvSpPr>
+            <a:spLocks noGrp="1"/>
+          </p:cNvSpPr>
+          <p:nvPr>
+            <p:ph type="ftr" sz="quarter" idx="11"/>
+          </p:nvPr>
+        </p:nvSpPr>
+        <p:spPr/>
+        <p:txBody>
+          <a:bodyPr/>
+          <a:lstStyle/>
+          <a:p>
+            <a:r>
+              <a:rPr lang="de-CH" smtClean="0"/>
+              <a:t>S.Bakocs, L.Stahel</a:t>
+            </a:r>
+            <a:endParaRPr lang="de-CH"/>
+          </a:p>
+        </p:txBody>
+      </p:sp>
+      <p:sp>
+        <p:nvSpPr>
+          <p:cNvPr id="8" name="Slide Number Placeholder 7"/>
+          <p:cNvSpPr>
+            <a:spLocks noGrp="1"/>
+          </p:cNvSpPr>
+          <p:nvPr>
+            <p:ph type="sldNum" sz="quarter" idx="12"/>
+          </p:nvPr>
+        </p:nvSpPr>
+        <p:spPr/>
+        <p:txBody>
+          <a:bodyPr/>
+          <a:lstStyle/>
+          <a:p>
+            <a:fld id="{0903F862-C958-4CC4-BEED-6508A7FB4281}" type="slidenum">
+              <a:rPr lang="de-CH" smtClean="0"/>
+              <a:t>29</a:t>
+            </a:fld>
+            <a:endParaRPr lang="de-CH"/>
+          </a:p>
+        </p:txBody>
+      </p:sp>
     </p:spTree>
     <p:extLst>
       <p:ext uri="{BB962C8B-B14F-4D97-AF65-F5344CB8AC3E}">
@@ -9793,6 +11314,75 @@
       </p:sp>
       <p:sp>
         <p:nvSpPr>
+          <p:cNvPr id="4" name="Date Placeholder 3"/>
+          <p:cNvSpPr>
+            <a:spLocks noGrp="1"/>
+          </p:cNvSpPr>
+          <p:nvPr>
+            <p:ph type="dt" sz="half" idx="10"/>
+          </p:nvPr>
+        </p:nvSpPr>
+        <p:spPr/>
+        <p:txBody>
+          <a:bodyPr/>
+          <a:lstStyle/>
+          <a:p>
+            <a:fld id="{26FD8762-30E1-47EC-98F1-5298A95E5DBB}" type="datetime1">
+              <a:rPr lang="de-CH" smtClean="0"/>
+              <a:t>04.01.2015</a:t>
+            </a:fld>
+            <a:endParaRPr lang="de-CH" dirty="0"/>
+          </a:p>
+        </p:txBody>
+      </p:sp>
+      <p:sp>
+        <p:nvSpPr>
+          <p:cNvPr id="9" name="Footer Placeholder 8"/>
+          <p:cNvSpPr>
+            <a:spLocks noGrp="1"/>
+          </p:cNvSpPr>
+          <p:nvPr>
+            <p:ph type="ftr" sz="quarter" idx="11"/>
+          </p:nvPr>
+        </p:nvSpPr>
+        <p:spPr/>
+        <p:txBody>
+          <a:bodyPr/>
+          <a:lstStyle/>
+          <a:p>
+            <a:r>
+              <a:rPr lang="de-CH" smtClean="0"/>
+              <a:t>S.Bakocs, L.Stahel</a:t>
+            </a:r>
+            <a:endParaRPr lang="de-CH"/>
+          </a:p>
+        </p:txBody>
+      </p:sp>
+      <p:sp>
+        <p:nvSpPr>
+          <p:cNvPr id="10" name="Slide Number Placeholder 9"/>
+          <p:cNvSpPr>
+            <a:spLocks noGrp="1"/>
+          </p:cNvSpPr>
+          <p:nvPr>
+            <p:ph type="sldNum" sz="quarter" idx="12"/>
+          </p:nvPr>
+        </p:nvSpPr>
+        <p:spPr/>
+        <p:txBody>
+          <a:bodyPr/>
+          <a:lstStyle/>
+          <a:p>
+            <a:fld id="{0903F862-C958-4CC4-BEED-6508A7FB4281}" type="slidenum">
+              <a:rPr lang="de-CH" smtClean="0"/>
+              <a:t>3</a:t>
+            </a:fld>
+            <a:endParaRPr lang="de-CH"/>
+          </a:p>
+        </p:txBody>
+      </p:sp>
+      <p:sp>
+        <p:nvSpPr>
           <p:cNvPr id="5" name="Rectangle 4"/>
           <p:cNvSpPr/>
           <p:nvPr/>
@@ -10284,6 +11874,75 @@
           </a:p>
         </p:txBody>
       </p:sp>
+      <p:sp>
+        <p:nvSpPr>
+          <p:cNvPr id="3" name="Date Placeholder 2"/>
+          <p:cNvSpPr>
+            <a:spLocks noGrp="1"/>
+          </p:cNvSpPr>
+          <p:nvPr>
+            <p:ph type="dt" sz="half" idx="10"/>
+          </p:nvPr>
+        </p:nvSpPr>
+        <p:spPr/>
+        <p:txBody>
+          <a:bodyPr/>
+          <a:lstStyle/>
+          <a:p>
+            <a:fld id="{07A6AAD1-C951-43B3-8921-73DAB60BC92F}" type="datetime1">
+              <a:rPr lang="de-CH" smtClean="0"/>
+              <a:t>04.01.2015</a:t>
+            </a:fld>
+            <a:endParaRPr lang="de-CH"/>
+          </a:p>
+        </p:txBody>
+      </p:sp>
+      <p:sp>
+        <p:nvSpPr>
+          <p:cNvPr id="7" name="Footer Placeholder 6"/>
+          <p:cNvSpPr>
+            <a:spLocks noGrp="1"/>
+          </p:cNvSpPr>
+          <p:nvPr>
+            <p:ph type="ftr" sz="quarter" idx="11"/>
+          </p:nvPr>
+        </p:nvSpPr>
+        <p:spPr/>
+        <p:txBody>
+          <a:bodyPr/>
+          <a:lstStyle/>
+          <a:p>
+            <a:r>
+              <a:rPr lang="de-CH" smtClean="0"/>
+              <a:t>S.Bakocs, L.Stahel</a:t>
+            </a:r>
+            <a:endParaRPr lang="de-CH"/>
+          </a:p>
+        </p:txBody>
+      </p:sp>
+      <p:sp>
+        <p:nvSpPr>
+          <p:cNvPr id="8" name="Slide Number Placeholder 7"/>
+          <p:cNvSpPr>
+            <a:spLocks noGrp="1"/>
+          </p:cNvSpPr>
+          <p:nvPr>
+            <p:ph type="sldNum" sz="quarter" idx="12"/>
+          </p:nvPr>
+        </p:nvSpPr>
+        <p:spPr/>
+        <p:txBody>
+          <a:bodyPr/>
+          <a:lstStyle/>
+          <a:p>
+            <a:fld id="{0903F862-C958-4CC4-BEED-6508A7FB4281}" type="slidenum">
+              <a:rPr lang="de-CH" smtClean="0"/>
+              <a:t>30</a:t>
+            </a:fld>
+            <a:endParaRPr lang="de-CH"/>
+          </a:p>
+        </p:txBody>
+      </p:sp>
     </p:spTree>
     <p:extLst>
       <p:ext uri="{BB962C8B-B14F-4D97-AF65-F5344CB8AC3E}">
@@ -10407,6 +12066,75 @@
               <a:rPr lang="de-CH" dirty="0" smtClean="0"/>
             </a:br>
             <a:endParaRPr lang="de-CH" dirty="0"/>
+          </a:p>
+        </p:txBody>
+      </p:sp>
+      <p:sp>
+        <p:nvSpPr>
+          <p:cNvPr id="3" name="Date Placeholder 2"/>
+          <p:cNvSpPr>
+            <a:spLocks noGrp="1"/>
+          </p:cNvSpPr>
+          <p:nvPr>
+            <p:ph type="dt" sz="half" idx="10"/>
+          </p:nvPr>
+        </p:nvSpPr>
+        <p:spPr/>
+        <p:txBody>
+          <a:bodyPr/>
+          <a:lstStyle/>
+          <a:p>
+            <a:fld id="{5B5E3997-D54A-4E51-9FF4-94BE3097135C}" type="datetime1">
+              <a:rPr lang="de-CH" smtClean="0"/>
+              <a:t>04.01.2015</a:t>
+            </a:fld>
+            <a:endParaRPr lang="de-CH"/>
+          </a:p>
+        </p:txBody>
+      </p:sp>
+      <p:sp>
+        <p:nvSpPr>
+          <p:cNvPr id="7" name="Footer Placeholder 6"/>
+          <p:cNvSpPr>
+            <a:spLocks noGrp="1"/>
+          </p:cNvSpPr>
+          <p:nvPr>
+            <p:ph type="ftr" sz="quarter" idx="11"/>
+          </p:nvPr>
+        </p:nvSpPr>
+        <p:spPr/>
+        <p:txBody>
+          <a:bodyPr/>
+          <a:lstStyle/>
+          <a:p>
+            <a:r>
+              <a:rPr lang="de-CH" smtClean="0"/>
+              <a:t>S.Bakocs, L.Stahel</a:t>
+            </a:r>
+            <a:endParaRPr lang="de-CH"/>
+          </a:p>
+        </p:txBody>
+      </p:sp>
+      <p:sp>
+        <p:nvSpPr>
+          <p:cNvPr id="8" name="Slide Number Placeholder 7"/>
+          <p:cNvSpPr>
+            <a:spLocks noGrp="1"/>
+          </p:cNvSpPr>
+          <p:nvPr>
+            <p:ph type="sldNum" sz="quarter" idx="12"/>
+          </p:nvPr>
+        </p:nvSpPr>
+        <p:spPr/>
+        <p:txBody>
+          <a:bodyPr/>
+          <a:lstStyle/>
+          <a:p>
+            <a:fld id="{0903F862-C958-4CC4-BEED-6508A7FB4281}" type="slidenum">
+              <a:rPr lang="de-CH" smtClean="0"/>
+              <a:t>31</a:t>
+            </a:fld>
+            <a:endParaRPr lang="de-CH"/>
           </a:p>
         </p:txBody>
       </p:sp>
@@ -10555,11 +12283,7 @@
             <a:pPr lvl="1"/>
             <a:r>
               <a:rPr lang="de-CH" dirty="0" smtClean="0"/>
-              <a:t>Sammelbare Items auf dem </a:t>
-            </a:r>
-            <a:r>
-              <a:rPr lang="de-CH" dirty="0" smtClean="0"/>
-              <a:t>Spielfeld</a:t>
+              <a:t>Sammelbare Items auf dem Spielfeld</a:t>
             </a:r>
           </a:p>
           <a:p>
@@ -10577,6 +12301,75 @@
           </a:p>
           <a:p>
             <a:endParaRPr lang="de-CH" dirty="0"/>
+          </a:p>
+        </p:txBody>
+      </p:sp>
+      <p:sp>
+        <p:nvSpPr>
+          <p:cNvPr id="3" name="Date Placeholder 2"/>
+          <p:cNvSpPr>
+            <a:spLocks noGrp="1"/>
+          </p:cNvSpPr>
+          <p:nvPr>
+            <p:ph type="dt" sz="half" idx="10"/>
+          </p:nvPr>
+        </p:nvSpPr>
+        <p:spPr/>
+        <p:txBody>
+          <a:bodyPr/>
+          <a:lstStyle/>
+          <a:p>
+            <a:fld id="{689686E4-2EEA-4EFD-BACC-D2E1E747EB78}" type="datetime1">
+              <a:rPr lang="de-CH" smtClean="0"/>
+              <a:t>04.01.2015</a:t>
+            </a:fld>
+            <a:endParaRPr lang="de-CH" dirty="0"/>
+          </a:p>
+        </p:txBody>
+      </p:sp>
+      <p:sp>
+        <p:nvSpPr>
+          <p:cNvPr id="6" name="Footer Placeholder 5"/>
+          <p:cNvSpPr>
+            <a:spLocks noGrp="1"/>
+          </p:cNvSpPr>
+          <p:nvPr>
+            <p:ph type="ftr" sz="quarter" idx="11"/>
+          </p:nvPr>
+        </p:nvSpPr>
+        <p:spPr/>
+        <p:txBody>
+          <a:bodyPr/>
+          <a:lstStyle/>
+          <a:p>
+            <a:r>
+              <a:rPr lang="de-CH" smtClean="0"/>
+              <a:t>S.Bakocs, L.Stahel</a:t>
+            </a:r>
+            <a:endParaRPr lang="de-CH"/>
+          </a:p>
+        </p:txBody>
+      </p:sp>
+      <p:sp>
+        <p:nvSpPr>
+          <p:cNvPr id="7" name="Slide Number Placeholder 6"/>
+          <p:cNvSpPr>
+            <a:spLocks noGrp="1"/>
+          </p:cNvSpPr>
+          <p:nvPr>
+            <p:ph type="sldNum" sz="quarter" idx="12"/>
+          </p:nvPr>
+        </p:nvSpPr>
+        <p:spPr/>
+        <p:txBody>
+          <a:bodyPr/>
+          <a:lstStyle/>
+          <a:p>
+            <a:fld id="{0903F862-C958-4CC4-BEED-6508A7FB4281}" type="slidenum">
+              <a:rPr lang="de-CH" smtClean="0"/>
+              <a:t>32</a:t>
+            </a:fld>
+            <a:endParaRPr lang="de-CH"/>
           </a:p>
         </p:txBody>
       </p:sp>
@@ -10659,6 +12452,75 @@
           </a:p>
         </p:txBody>
       </p:sp>
+      <p:sp>
+        <p:nvSpPr>
+          <p:cNvPr id="2" name="Date Placeholder 1"/>
+          <p:cNvSpPr>
+            <a:spLocks noGrp="1"/>
+          </p:cNvSpPr>
+          <p:nvPr>
+            <p:ph type="dt" sz="half" idx="10"/>
+          </p:nvPr>
+        </p:nvSpPr>
+        <p:spPr/>
+        <p:txBody>
+          <a:bodyPr/>
+          <a:lstStyle/>
+          <a:p>
+            <a:fld id="{0E67D16F-E7B6-4FF7-863C-D096957C447A}" type="datetime1">
+              <a:rPr lang="de-CH" smtClean="0"/>
+              <a:t>04.01.2015</a:t>
+            </a:fld>
+            <a:endParaRPr lang="de-CH"/>
+          </a:p>
+        </p:txBody>
+      </p:sp>
+      <p:sp>
+        <p:nvSpPr>
+          <p:cNvPr id="4" name="Footer Placeholder 3"/>
+          <p:cNvSpPr>
+            <a:spLocks noGrp="1"/>
+          </p:cNvSpPr>
+          <p:nvPr>
+            <p:ph type="ftr" sz="quarter" idx="11"/>
+          </p:nvPr>
+        </p:nvSpPr>
+        <p:spPr/>
+        <p:txBody>
+          <a:bodyPr/>
+          <a:lstStyle/>
+          <a:p>
+            <a:r>
+              <a:rPr lang="de-CH" smtClean="0"/>
+              <a:t>S.Bakocs, L.Stahel</a:t>
+            </a:r>
+            <a:endParaRPr lang="de-CH" dirty="0"/>
+          </a:p>
+        </p:txBody>
+      </p:sp>
+      <p:sp>
+        <p:nvSpPr>
+          <p:cNvPr id="7" name="Slide Number Placeholder 6"/>
+          <p:cNvSpPr>
+            <a:spLocks noGrp="1"/>
+          </p:cNvSpPr>
+          <p:nvPr>
+            <p:ph type="sldNum" sz="quarter" idx="12"/>
+          </p:nvPr>
+        </p:nvSpPr>
+        <p:spPr/>
+        <p:txBody>
+          <a:bodyPr/>
+          <a:lstStyle/>
+          <a:p>
+            <a:fld id="{0903F862-C958-4CC4-BEED-6508A7FB4281}" type="slidenum">
+              <a:rPr lang="de-CH" smtClean="0"/>
+              <a:t>33</a:t>
+            </a:fld>
+            <a:endParaRPr lang="de-CH"/>
+          </a:p>
+        </p:txBody>
+      </p:sp>
     </p:spTree>
     <p:extLst>
       <p:ext uri="{BB962C8B-B14F-4D97-AF65-F5344CB8AC3E}">
@@ -10730,6 +12592,75 @@
           <a:bodyPr/>
           <a:lstStyle/>
           <a:p>
+            <a:endParaRPr lang="de-CH"/>
+          </a:p>
+        </p:txBody>
+      </p:sp>
+      <p:sp>
+        <p:nvSpPr>
+          <p:cNvPr id="4" name="Date Placeholder 3"/>
+          <p:cNvSpPr>
+            <a:spLocks noGrp="1"/>
+          </p:cNvSpPr>
+          <p:nvPr>
+            <p:ph type="dt" sz="half" idx="10"/>
+          </p:nvPr>
+        </p:nvSpPr>
+        <p:spPr/>
+        <p:txBody>
+          <a:bodyPr/>
+          <a:lstStyle/>
+          <a:p>
+            <a:fld id="{A9B58005-9CBE-479F-8B58-090AAD00E0D3}" type="datetime1">
+              <a:rPr lang="de-CH" smtClean="0"/>
+              <a:t>04.01.2015</a:t>
+            </a:fld>
+            <a:endParaRPr lang="de-CH" dirty="0"/>
+          </a:p>
+        </p:txBody>
+      </p:sp>
+      <p:sp>
+        <p:nvSpPr>
+          <p:cNvPr id="7" name="Footer Placeholder 6"/>
+          <p:cNvSpPr>
+            <a:spLocks noGrp="1"/>
+          </p:cNvSpPr>
+          <p:nvPr>
+            <p:ph type="ftr" sz="quarter" idx="11"/>
+          </p:nvPr>
+        </p:nvSpPr>
+        <p:spPr/>
+        <p:txBody>
+          <a:bodyPr/>
+          <a:lstStyle/>
+          <a:p>
+            <a:r>
+              <a:rPr lang="de-CH" smtClean="0"/>
+              <a:t>S.Bakocs, L.Stahel</a:t>
+            </a:r>
+            <a:endParaRPr lang="de-CH"/>
+          </a:p>
+        </p:txBody>
+      </p:sp>
+      <p:sp>
+        <p:nvSpPr>
+          <p:cNvPr id="8" name="Slide Number Placeholder 7"/>
+          <p:cNvSpPr>
+            <a:spLocks noGrp="1"/>
+          </p:cNvSpPr>
+          <p:nvPr>
+            <p:ph type="sldNum" sz="quarter" idx="12"/>
+          </p:nvPr>
+        </p:nvSpPr>
+        <p:spPr/>
+        <p:txBody>
+          <a:bodyPr/>
+          <a:lstStyle/>
+          <a:p>
+            <a:fld id="{0903F862-C958-4CC4-BEED-6508A7FB4281}" type="slidenum">
+              <a:rPr lang="de-CH" smtClean="0"/>
+              <a:t>4</a:t>
+            </a:fld>
             <a:endParaRPr lang="de-CH"/>
           </a:p>
         </p:txBody>
@@ -10878,6 +12809,75 @@
       </p:pic>
       <p:sp>
         <p:nvSpPr>
+          <p:cNvPr id="4" name="Date Placeholder 3"/>
+          <p:cNvSpPr>
+            <a:spLocks noGrp="1"/>
+          </p:cNvSpPr>
+          <p:nvPr>
+            <p:ph type="dt" sz="half" idx="10"/>
+          </p:nvPr>
+        </p:nvSpPr>
+        <p:spPr/>
+        <p:txBody>
+          <a:bodyPr/>
+          <a:lstStyle/>
+          <a:p>
+            <a:fld id="{BBCF0248-C58F-4153-AE70-F9DBC6DBDC9D}" type="datetime1">
+              <a:rPr lang="de-CH" smtClean="0"/>
+              <a:t>04.01.2015</a:t>
+            </a:fld>
+            <a:endParaRPr lang="de-CH"/>
+          </a:p>
+        </p:txBody>
+      </p:sp>
+      <p:sp>
+        <p:nvSpPr>
+          <p:cNvPr id="9" name="Footer Placeholder 8"/>
+          <p:cNvSpPr>
+            <a:spLocks noGrp="1"/>
+          </p:cNvSpPr>
+          <p:nvPr>
+            <p:ph type="ftr" sz="quarter" idx="11"/>
+          </p:nvPr>
+        </p:nvSpPr>
+        <p:spPr/>
+        <p:txBody>
+          <a:bodyPr/>
+          <a:lstStyle/>
+          <a:p>
+            <a:r>
+              <a:rPr lang="de-CH" smtClean="0"/>
+              <a:t>S.Bakocs, L.Stahel</a:t>
+            </a:r>
+            <a:endParaRPr lang="de-CH"/>
+          </a:p>
+        </p:txBody>
+      </p:sp>
+      <p:sp>
+        <p:nvSpPr>
+          <p:cNvPr id="10" name="Slide Number Placeholder 9"/>
+          <p:cNvSpPr>
+            <a:spLocks noGrp="1"/>
+          </p:cNvSpPr>
+          <p:nvPr>
+            <p:ph type="sldNum" sz="quarter" idx="12"/>
+          </p:nvPr>
+        </p:nvSpPr>
+        <p:spPr/>
+        <p:txBody>
+          <a:bodyPr/>
+          <a:lstStyle/>
+          <a:p>
+            <a:fld id="{0903F862-C958-4CC4-BEED-6508A7FB4281}" type="slidenum">
+              <a:rPr lang="de-CH" smtClean="0"/>
+              <a:t>5</a:t>
+            </a:fld>
+            <a:endParaRPr lang="de-CH"/>
+          </a:p>
+        </p:txBody>
+      </p:sp>
+      <p:sp>
+        <p:nvSpPr>
           <p:cNvPr id="6" name="Shape 46"/>
           <p:cNvSpPr txBox="1"/>
           <p:nvPr/>
@@ -11094,6 +13094,75 @@
           <a:p>
             <a:pPr lvl="1"/>
             <a:endParaRPr lang="de-CH" dirty="0"/>
+          </a:p>
+        </p:txBody>
+      </p:sp>
+      <p:sp>
+        <p:nvSpPr>
+          <p:cNvPr id="4" name="Date Placeholder 3"/>
+          <p:cNvSpPr>
+            <a:spLocks noGrp="1"/>
+          </p:cNvSpPr>
+          <p:nvPr>
+            <p:ph type="dt" sz="half" idx="10"/>
+          </p:nvPr>
+        </p:nvSpPr>
+        <p:spPr/>
+        <p:txBody>
+          <a:bodyPr/>
+          <a:lstStyle/>
+          <a:p>
+            <a:fld id="{5D8F3713-CD9F-4077-9D5B-FDB7DADDC6D1}" type="datetime1">
+              <a:rPr lang="de-CH" smtClean="0"/>
+              <a:t>04.01.2015</a:t>
+            </a:fld>
+            <a:endParaRPr lang="de-CH" dirty="0"/>
+          </a:p>
+        </p:txBody>
+      </p:sp>
+      <p:sp>
+        <p:nvSpPr>
+          <p:cNvPr id="6" name="Footer Placeholder 5"/>
+          <p:cNvSpPr>
+            <a:spLocks noGrp="1"/>
+          </p:cNvSpPr>
+          <p:nvPr>
+            <p:ph type="ftr" sz="quarter" idx="11"/>
+          </p:nvPr>
+        </p:nvSpPr>
+        <p:spPr/>
+        <p:txBody>
+          <a:bodyPr/>
+          <a:lstStyle/>
+          <a:p>
+            <a:r>
+              <a:rPr lang="de-CH" smtClean="0"/>
+              <a:t>S.Bakocs, L.Stahel</a:t>
+            </a:r>
+            <a:endParaRPr lang="de-CH"/>
+          </a:p>
+        </p:txBody>
+      </p:sp>
+      <p:sp>
+        <p:nvSpPr>
+          <p:cNvPr id="8" name="Slide Number Placeholder 7"/>
+          <p:cNvSpPr>
+            <a:spLocks noGrp="1"/>
+          </p:cNvSpPr>
+          <p:nvPr>
+            <p:ph type="sldNum" sz="quarter" idx="12"/>
+          </p:nvPr>
+        </p:nvSpPr>
+        <p:spPr/>
+        <p:txBody>
+          <a:bodyPr/>
+          <a:lstStyle/>
+          <a:p>
+            <a:fld id="{0903F862-C958-4CC4-BEED-6508A7FB4281}" type="slidenum">
+              <a:rPr lang="de-CH" smtClean="0"/>
+              <a:t>6</a:t>
+            </a:fld>
+            <a:endParaRPr lang="de-CH"/>
           </a:p>
         </p:txBody>
       </p:sp>
@@ -11426,13 +13495,78 @@
           <a:p>
             <a:r>
               <a:rPr lang="de-CH" dirty="0" smtClean="0"/>
-              <a:t>Varianten</a:t>
-            </a:r>
-            <a:r>
-              <a:rPr lang="de-CH" dirty="0" smtClean="0"/>
-              <a:t>, Lösungen, Probleme, Erkenntnisse</a:t>
+              <a:t>Varianten, Lösungen, Probleme, Erkenntnisse</a:t>
             </a:r>
             <a:endParaRPr lang="de-CH" dirty="0"/>
+          </a:p>
+        </p:txBody>
+      </p:sp>
+      <p:sp>
+        <p:nvSpPr>
+          <p:cNvPr id="2" name="Date Placeholder 1"/>
+          <p:cNvSpPr>
+            <a:spLocks noGrp="1"/>
+          </p:cNvSpPr>
+          <p:nvPr>
+            <p:ph type="dt" sz="half" idx="10"/>
+          </p:nvPr>
+        </p:nvSpPr>
+        <p:spPr/>
+        <p:txBody>
+          <a:bodyPr/>
+          <a:lstStyle/>
+          <a:p>
+            <a:fld id="{9893E16F-4B9E-497C-B9CD-A7837DC7E1D7}" type="datetime1">
+              <a:rPr lang="de-CH" smtClean="0"/>
+              <a:t>04.01.2015</a:t>
+            </a:fld>
+            <a:endParaRPr lang="de-CH"/>
+          </a:p>
+        </p:txBody>
+      </p:sp>
+      <p:sp>
+        <p:nvSpPr>
+          <p:cNvPr id="5" name="Footer Placeholder 4"/>
+          <p:cNvSpPr>
+            <a:spLocks noGrp="1"/>
+          </p:cNvSpPr>
+          <p:nvPr>
+            <p:ph type="ftr" sz="quarter" idx="11"/>
+          </p:nvPr>
+        </p:nvSpPr>
+        <p:spPr/>
+        <p:txBody>
+          <a:bodyPr/>
+          <a:lstStyle/>
+          <a:p>
+            <a:r>
+              <a:rPr lang="de-CH" smtClean="0"/>
+              <a:t>S.Bakocs, L.Stahel</a:t>
+            </a:r>
+            <a:endParaRPr lang="de-CH" dirty="0"/>
+          </a:p>
+        </p:txBody>
+      </p:sp>
+      <p:sp>
+        <p:nvSpPr>
+          <p:cNvPr id="7" name="Slide Number Placeholder 6"/>
+          <p:cNvSpPr>
+            <a:spLocks noGrp="1"/>
+          </p:cNvSpPr>
+          <p:nvPr>
+            <p:ph type="sldNum" sz="quarter" idx="12"/>
+          </p:nvPr>
+        </p:nvSpPr>
+        <p:spPr/>
+        <p:txBody>
+          <a:bodyPr/>
+          <a:lstStyle/>
+          <a:p>
+            <a:fld id="{0903F862-C958-4CC4-BEED-6508A7FB4281}" type="slidenum">
+              <a:rPr lang="de-CH" smtClean="0"/>
+              <a:t>7</a:t>
+            </a:fld>
+            <a:endParaRPr lang="de-CH"/>
           </a:p>
         </p:txBody>
       </p:sp>
@@ -11556,11 +13690,7 @@
             </a:pPr>
             <a:r>
               <a:rPr lang="en" dirty="0" smtClean="0"/>
-              <a:t>DOM</a:t>
-            </a:r>
-            <a:r>
-              <a:rPr lang="en" dirty="0" smtClean="0"/>
-              <a:t> </a:t>
+              <a:t>DOM </a:t>
             </a:r>
           </a:p>
           <a:p>
@@ -11611,6 +13741,75 @@
               <a:t> </a:t>
             </a:r>
             <a:endParaRPr lang="en" dirty="0"/>
+          </a:p>
+        </p:txBody>
+      </p:sp>
+      <p:sp>
+        <p:nvSpPr>
+          <p:cNvPr id="2" name="Date Placeholder 1"/>
+          <p:cNvSpPr>
+            <a:spLocks noGrp="1"/>
+          </p:cNvSpPr>
+          <p:nvPr>
+            <p:ph type="dt" sz="half" idx="10"/>
+          </p:nvPr>
+        </p:nvSpPr>
+        <p:spPr/>
+        <p:txBody>
+          <a:bodyPr/>
+          <a:lstStyle/>
+          <a:p>
+            <a:fld id="{2D094ECB-9276-4E07-802E-5B1F5268D1EA}" type="datetime1">
+              <a:rPr lang="de-CH" smtClean="0"/>
+              <a:t>04.01.2015</a:t>
+            </a:fld>
+            <a:endParaRPr lang="de-CH" dirty="0"/>
+          </a:p>
+        </p:txBody>
+      </p:sp>
+      <p:sp>
+        <p:nvSpPr>
+          <p:cNvPr id="4" name="Footer Placeholder 3"/>
+          <p:cNvSpPr>
+            <a:spLocks noGrp="1"/>
+          </p:cNvSpPr>
+          <p:nvPr>
+            <p:ph type="ftr" sz="quarter" idx="11"/>
+          </p:nvPr>
+        </p:nvSpPr>
+        <p:spPr/>
+        <p:txBody>
+          <a:bodyPr/>
+          <a:lstStyle/>
+          <a:p>
+            <a:r>
+              <a:rPr lang="de-CH" smtClean="0"/>
+              <a:t>S.Bakocs, L.Stahel</a:t>
+            </a:r>
+            <a:endParaRPr lang="de-CH"/>
+          </a:p>
+        </p:txBody>
+      </p:sp>
+      <p:sp>
+        <p:nvSpPr>
+          <p:cNvPr id="5" name="Slide Number Placeholder 4"/>
+          <p:cNvSpPr>
+            <a:spLocks noGrp="1"/>
+          </p:cNvSpPr>
+          <p:nvPr>
+            <p:ph type="sldNum" sz="quarter" idx="12"/>
+          </p:nvPr>
+        </p:nvSpPr>
+        <p:spPr/>
+        <p:txBody>
+          <a:bodyPr/>
+          <a:lstStyle/>
+          <a:p>
+            <a:fld id="{0903F862-C958-4CC4-BEED-6508A7FB4281}" type="slidenum">
+              <a:rPr lang="de-CH" smtClean="0"/>
+              <a:t>8</a:t>
+            </a:fld>
+            <a:endParaRPr lang="de-CH"/>
           </a:p>
         </p:txBody>
       </p:sp>
@@ -11719,11 +13918,7 @@
             </a:pPr>
             <a:r>
               <a:rPr lang="en" dirty="0"/>
-              <a:t>n*n</a:t>
-            </a:r>
-            <a:r>
-              <a:rPr lang="en" dirty="0"/>
-              <a:t> Divisionmatrix</a:t>
+              <a:t>n*n Divisionmatrix</a:t>
             </a:r>
           </a:p>
           <a:p>
@@ -11737,11 +13932,7 @@
             </a:pPr>
             <a:r>
               <a:rPr lang="en" dirty="0"/>
-              <a:t>Koordinaten</a:t>
-            </a:r>
-            <a:r>
-              <a:rPr lang="en" dirty="0"/>
-              <a:t> als Klassennamen</a:t>
+              <a:t>Koordinaten als Klassennamen</a:t>
             </a:r>
           </a:p>
           <a:p>
@@ -11836,6 +14027,75 @@
           <a:bodyPr/>
           <a:lstStyle/>
           <a:p>
+            <a:endParaRPr lang="de-CH"/>
+          </a:p>
+        </p:txBody>
+      </p:sp>
+      <p:sp>
+        <p:nvSpPr>
+          <p:cNvPr id="3" name="Date Placeholder 2"/>
+          <p:cNvSpPr>
+            <a:spLocks noGrp="1"/>
+          </p:cNvSpPr>
+          <p:nvPr>
+            <p:ph type="dt" sz="half" idx="10"/>
+          </p:nvPr>
+        </p:nvSpPr>
+        <p:spPr/>
+        <p:txBody>
+          <a:bodyPr/>
+          <a:lstStyle/>
+          <a:p>
+            <a:fld id="{49945ABF-9B7A-4426-8B70-EFA252B88090}" type="datetime1">
+              <a:rPr lang="de-CH" smtClean="0"/>
+              <a:t>04.01.2015</a:t>
+            </a:fld>
+            <a:endParaRPr lang="de-CH"/>
+          </a:p>
+        </p:txBody>
+      </p:sp>
+      <p:sp>
+        <p:nvSpPr>
+          <p:cNvPr id="5" name="Footer Placeholder 4"/>
+          <p:cNvSpPr>
+            <a:spLocks noGrp="1"/>
+          </p:cNvSpPr>
+          <p:nvPr>
+            <p:ph type="ftr" sz="quarter" idx="11"/>
+          </p:nvPr>
+        </p:nvSpPr>
+        <p:spPr/>
+        <p:txBody>
+          <a:bodyPr/>
+          <a:lstStyle/>
+          <a:p>
+            <a:r>
+              <a:rPr lang="de-CH" smtClean="0"/>
+              <a:t>S.Bakocs, L.Stahel</a:t>
+            </a:r>
+            <a:endParaRPr lang="de-CH"/>
+          </a:p>
+        </p:txBody>
+      </p:sp>
+      <p:sp>
+        <p:nvSpPr>
+          <p:cNvPr id="6" name="Slide Number Placeholder 5"/>
+          <p:cNvSpPr>
+            <a:spLocks noGrp="1"/>
+          </p:cNvSpPr>
+          <p:nvPr>
+            <p:ph type="sldNum" sz="quarter" idx="12"/>
+          </p:nvPr>
+        </p:nvSpPr>
+        <p:spPr/>
+        <p:txBody>
+          <a:bodyPr/>
+          <a:lstStyle/>
+          <a:p>
+            <a:fld id="{0903F862-C958-4CC4-BEED-6508A7FB4281}" type="slidenum">
+              <a:rPr lang="de-CH" smtClean="0"/>
+              <a:t>9</a:t>
+            </a:fld>
             <a:endParaRPr lang="de-CH"/>
           </a:p>
         </p:txBody>

</xml_diff>